<commit_message>
Actualizado notebook según lineamientos y agregado reporte.
Agregado reporte y actualizado el jupyter y presentación.
</commit_message>
<xml_diff>
--- a/Music Notation CNN.pptx
+++ b/Music Notation CNN.pptx
@@ -5,10 +5,10 @@
     <p:sldMasterId id="2147483648" r:id="rId1"/>
   </p:sldMasterIdLst>
   <p:notesMasterIdLst>
-    <p:notesMasterId r:id="rId20"/>
+    <p:notesMasterId r:id="rId22"/>
   </p:notesMasterIdLst>
   <p:handoutMasterIdLst>
-    <p:handoutMasterId r:id="rId21"/>
+    <p:handoutMasterId r:id="rId23"/>
   </p:handoutMasterIdLst>
   <p:sldIdLst>
     <p:sldId id="256" r:id="rId2"/>
@@ -25,10 +25,12 @@
     <p:sldId id="272" r:id="rId13"/>
     <p:sldId id="273" r:id="rId14"/>
     <p:sldId id="274" r:id="rId15"/>
-    <p:sldId id="260" r:id="rId16"/>
-    <p:sldId id="258" r:id="rId17"/>
-    <p:sldId id="259" r:id="rId18"/>
-    <p:sldId id="275" r:id="rId19"/>
+    <p:sldId id="276" r:id="rId16"/>
+    <p:sldId id="277" r:id="rId17"/>
+    <p:sldId id="260" r:id="rId18"/>
+    <p:sldId id="258" r:id="rId19"/>
+    <p:sldId id="259" r:id="rId20"/>
+    <p:sldId id="275" r:id="rId21"/>
   </p:sldIdLst>
   <p:sldSz cx="12192000" cy="6858000"/>
   <p:notesSz cx="6858000" cy="9144000"/>
@@ -885,7 +887,975 @@
 </dgm:colorsDef>
 </file>
 
+<file path=ppt/diagrams/colors2.xml><?xml version="1.0" encoding="utf-8"?>
+<dgm:colorsDef xmlns:dgm="http://schemas.openxmlformats.org/drawingml/2006/diagram" xmlns:a="http://schemas.openxmlformats.org/drawingml/2006/main" uniqueId="urn:microsoft.com/office/officeart/2005/8/colors/accent1_2">
+  <dgm:title val=""/>
+  <dgm:desc val=""/>
+  <dgm:catLst>
+    <dgm:cat type="accent1" pri="11200"/>
+  </dgm:catLst>
+  <dgm:styleLbl name="node0">
+    <dgm:fillClrLst meth="repeat">
+      <a:schemeClr val="accent1"/>
+    </dgm:fillClrLst>
+    <dgm:linClrLst meth="repeat">
+      <a:schemeClr val="lt1"/>
+    </dgm:linClrLst>
+    <dgm:effectClrLst/>
+    <dgm:txLinClrLst/>
+    <dgm:txFillClrLst/>
+    <dgm:txEffectClrLst/>
+  </dgm:styleLbl>
+  <dgm:styleLbl name="alignNode1">
+    <dgm:fillClrLst meth="repeat">
+      <a:schemeClr val="accent1"/>
+    </dgm:fillClrLst>
+    <dgm:linClrLst meth="repeat">
+      <a:schemeClr val="accent1"/>
+    </dgm:linClrLst>
+    <dgm:effectClrLst/>
+    <dgm:txLinClrLst/>
+    <dgm:txFillClrLst/>
+    <dgm:txEffectClrLst/>
+  </dgm:styleLbl>
+  <dgm:styleLbl name="node1">
+    <dgm:fillClrLst meth="repeat">
+      <a:schemeClr val="accent1"/>
+    </dgm:fillClrLst>
+    <dgm:linClrLst meth="repeat">
+      <a:schemeClr val="lt1"/>
+    </dgm:linClrLst>
+    <dgm:effectClrLst/>
+    <dgm:txLinClrLst/>
+    <dgm:txFillClrLst/>
+    <dgm:txEffectClrLst/>
+  </dgm:styleLbl>
+  <dgm:styleLbl name="lnNode1">
+    <dgm:fillClrLst meth="repeat">
+      <a:schemeClr val="accent1"/>
+    </dgm:fillClrLst>
+    <dgm:linClrLst meth="repeat">
+      <a:schemeClr val="lt1"/>
+    </dgm:linClrLst>
+    <dgm:effectClrLst/>
+    <dgm:txLinClrLst/>
+    <dgm:txFillClrLst/>
+    <dgm:txEffectClrLst/>
+  </dgm:styleLbl>
+  <dgm:styleLbl name="vennNode1">
+    <dgm:fillClrLst meth="repeat">
+      <a:schemeClr val="accent1">
+        <a:alpha val="50000"/>
+      </a:schemeClr>
+    </dgm:fillClrLst>
+    <dgm:linClrLst meth="repeat">
+      <a:schemeClr val="lt1"/>
+    </dgm:linClrLst>
+    <dgm:effectClrLst/>
+    <dgm:txLinClrLst/>
+    <dgm:txFillClrLst/>
+    <dgm:txEffectClrLst/>
+  </dgm:styleLbl>
+  <dgm:styleLbl name="node2">
+    <dgm:fillClrLst meth="repeat">
+      <a:schemeClr val="accent1"/>
+    </dgm:fillClrLst>
+    <dgm:linClrLst meth="repeat">
+      <a:schemeClr val="lt1"/>
+    </dgm:linClrLst>
+    <dgm:effectClrLst/>
+    <dgm:txLinClrLst/>
+    <dgm:txFillClrLst/>
+    <dgm:txEffectClrLst/>
+  </dgm:styleLbl>
+  <dgm:styleLbl name="node3">
+    <dgm:fillClrLst meth="repeat">
+      <a:schemeClr val="accent1"/>
+    </dgm:fillClrLst>
+    <dgm:linClrLst meth="repeat">
+      <a:schemeClr val="lt1"/>
+    </dgm:linClrLst>
+    <dgm:effectClrLst/>
+    <dgm:txLinClrLst/>
+    <dgm:txFillClrLst/>
+    <dgm:txEffectClrLst/>
+  </dgm:styleLbl>
+  <dgm:styleLbl name="node4">
+    <dgm:fillClrLst meth="repeat">
+      <a:schemeClr val="accent1"/>
+    </dgm:fillClrLst>
+    <dgm:linClrLst meth="repeat">
+      <a:schemeClr val="lt1"/>
+    </dgm:linClrLst>
+    <dgm:effectClrLst/>
+    <dgm:txLinClrLst/>
+    <dgm:txFillClrLst/>
+    <dgm:txEffectClrLst/>
+  </dgm:styleLbl>
+  <dgm:styleLbl name="fgImgPlace1">
+    <dgm:fillClrLst meth="repeat">
+      <a:schemeClr val="accent1">
+        <a:tint val="50000"/>
+      </a:schemeClr>
+    </dgm:fillClrLst>
+    <dgm:linClrLst meth="repeat">
+      <a:schemeClr val="lt1"/>
+    </dgm:linClrLst>
+    <dgm:effectClrLst/>
+    <dgm:txLinClrLst/>
+    <dgm:txFillClrLst meth="repeat">
+      <a:schemeClr val="lt1"/>
+    </dgm:txFillClrLst>
+    <dgm:txEffectClrLst/>
+  </dgm:styleLbl>
+  <dgm:styleLbl name="alignImgPlace1">
+    <dgm:fillClrLst meth="repeat">
+      <a:schemeClr val="accent1">
+        <a:tint val="50000"/>
+      </a:schemeClr>
+    </dgm:fillClrLst>
+    <dgm:linClrLst meth="repeat">
+      <a:schemeClr val="lt1"/>
+    </dgm:linClrLst>
+    <dgm:effectClrLst/>
+    <dgm:txLinClrLst/>
+    <dgm:txFillClrLst meth="repeat">
+      <a:schemeClr val="lt1"/>
+    </dgm:txFillClrLst>
+    <dgm:txEffectClrLst/>
+  </dgm:styleLbl>
+  <dgm:styleLbl name="bgImgPlace1">
+    <dgm:fillClrLst meth="repeat">
+      <a:schemeClr val="accent1">
+        <a:tint val="50000"/>
+      </a:schemeClr>
+    </dgm:fillClrLst>
+    <dgm:linClrLst meth="repeat">
+      <a:schemeClr val="lt1"/>
+    </dgm:linClrLst>
+    <dgm:effectClrLst/>
+    <dgm:txLinClrLst/>
+    <dgm:txFillClrLst meth="repeat">
+      <a:schemeClr val="lt1"/>
+    </dgm:txFillClrLst>
+    <dgm:txEffectClrLst/>
+  </dgm:styleLbl>
+  <dgm:styleLbl name="sibTrans2D1">
+    <dgm:fillClrLst meth="repeat">
+      <a:schemeClr val="accent1">
+        <a:tint val="60000"/>
+      </a:schemeClr>
+    </dgm:fillClrLst>
+    <dgm:linClrLst meth="repeat">
+      <a:schemeClr val="accent1">
+        <a:tint val="60000"/>
+      </a:schemeClr>
+    </dgm:linClrLst>
+    <dgm:effectClrLst/>
+    <dgm:txLinClrLst/>
+    <dgm:txFillClrLst/>
+    <dgm:txEffectClrLst/>
+  </dgm:styleLbl>
+  <dgm:styleLbl name="fgSibTrans2D1">
+    <dgm:fillClrLst meth="repeat">
+      <a:schemeClr val="accent1">
+        <a:tint val="60000"/>
+      </a:schemeClr>
+    </dgm:fillClrLst>
+    <dgm:linClrLst meth="repeat">
+      <a:schemeClr val="accent1">
+        <a:tint val="60000"/>
+      </a:schemeClr>
+    </dgm:linClrLst>
+    <dgm:effectClrLst/>
+    <dgm:txLinClrLst/>
+    <dgm:txFillClrLst/>
+    <dgm:txEffectClrLst/>
+  </dgm:styleLbl>
+  <dgm:styleLbl name="bgSibTrans2D1">
+    <dgm:fillClrLst meth="repeat">
+      <a:schemeClr val="accent1">
+        <a:tint val="60000"/>
+      </a:schemeClr>
+    </dgm:fillClrLst>
+    <dgm:linClrLst meth="repeat">
+      <a:schemeClr val="accent1">
+        <a:tint val="60000"/>
+      </a:schemeClr>
+    </dgm:linClrLst>
+    <dgm:effectClrLst/>
+    <dgm:txLinClrLst/>
+    <dgm:txFillClrLst/>
+    <dgm:txEffectClrLst/>
+  </dgm:styleLbl>
+  <dgm:styleLbl name="sibTrans1D1">
+    <dgm:fillClrLst meth="repeat">
+      <a:schemeClr val="accent1"/>
+    </dgm:fillClrLst>
+    <dgm:linClrLst meth="repeat">
+      <a:schemeClr val="accent1"/>
+    </dgm:linClrLst>
+    <dgm:effectClrLst/>
+    <dgm:txLinClrLst/>
+    <dgm:txFillClrLst meth="repeat">
+      <a:schemeClr val="tx1"/>
+    </dgm:txFillClrLst>
+    <dgm:txEffectClrLst/>
+  </dgm:styleLbl>
+  <dgm:styleLbl name="callout">
+    <dgm:fillClrLst meth="repeat">
+      <a:schemeClr val="accent1"/>
+    </dgm:fillClrLst>
+    <dgm:linClrLst meth="repeat">
+      <a:schemeClr val="accent1">
+        <a:tint val="50000"/>
+      </a:schemeClr>
+    </dgm:linClrLst>
+    <dgm:effectClrLst/>
+    <dgm:txLinClrLst/>
+    <dgm:txFillClrLst meth="repeat">
+      <a:schemeClr val="tx1"/>
+    </dgm:txFillClrLst>
+    <dgm:txEffectClrLst/>
+  </dgm:styleLbl>
+  <dgm:styleLbl name="asst0">
+    <dgm:fillClrLst meth="repeat">
+      <a:schemeClr val="accent1"/>
+    </dgm:fillClrLst>
+    <dgm:linClrLst meth="repeat">
+      <a:schemeClr val="lt1"/>
+    </dgm:linClrLst>
+    <dgm:effectClrLst/>
+    <dgm:txLinClrLst/>
+    <dgm:txFillClrLst/>
+    <dgm:txEffectClrLst/>
+  </dgm:styleLbl>
+  <dgm:styleLbl name="asst1">
+    <dgm:fillClrLst meth="repeat">
+      <a:schemeClr val="accent1"/>
+    </dgm:fillClrLst>
+    <dgm:linClrLst meth="repeat">
+      <a:schemeClr val="lt1"/>
+    </dgm:linClrLst>
+    <dgm:effectClrLst/>
+    <dgm:txLinClrLst/>
+    <dgm:txFillClrLst/>
+    <dgm:txEffectClrLst/>
+  </dgm:styleLbl>
+  <dgm:styleLbl name="asst2">
+    <dgm:fillClrLst meth="repeat">
+      <a:schemeClr val="accent1"/>
+    </dgm:fillClrLst>
+    <dgm:linClrLst meth="repeat">
+      <a:schemeClr val="lt1"/>
+    </dgm:linClrLst>
+    <dgm:effectClrLst/>
+    <dgm:txLinClrLst/>
+    <dgm:txFillClrLst/>
+    <dgm:txEffectClrLst/>
+  </dgm:styleLbl>
+  <dgm:styleLbl name="asst3">
+    <dgm:fillClrLst meth="repeat">
+      <a:schemeClr val="accent1"/>
+    </dgm:fillClrLst>
+    <dgm:linClrLst meth="repeat">
+      <a:schemeClr val="lt1"/>
+    </dgm:linClrLst>
+    <dgm:effectClrLst/>
+    <dgm:txLinClrLst/>
+    <dgm:txFillClrLst/>
+    <dgm:txEffectClrLst/>
+  </dgm:styleLbl>
+  <dgm:styleLbl name="asst4">
+    <dgm:fillClrLst meth="repeat">
+      <a:schemeClr val="accent1"/>
+    </dgm:fillClrLst>
+    <dgm:linClrLst meth="repeat">
+      <a:schemeClr val="lt1"/>
+    </dgm:linClrLst>
+    <dgm:effectClrLst/>
+    <dgm:txLinClrLst/>
+    <dgm:txFillClrLst/>
+    <dgm:txEffectClrLst/>
+  </dgm:styleLbl>
+  <dgm:styleLbl name="parChTrans2D1">
+    <dgm:fillClrLst meth="repeat">
+      <a:schemeClr val="accent1">
+        <a:tint val="60000"/>
+      </a:schemeClr>
+    </dgm:fillClrLst>
+    <dgm:linClrLst meth="repeat">
+      <a:schemeClr val="accent1">
+        <a:tint val="60000"/>
+      </a:schemeClr>
+    </dgm:linClrLst>
+    <dgm:effectClrLst/>
+    <dgm:txLinClrLst/>
+    <dgm:txFillClrLst meth="repeat">
+      <a:schemeClr val="lt1"/>
+    </dgm:txFillClrLst>
+    <dgm:txEffectClrLst/>
+  </dgm:styleLbl>
+  <dgm:styleLbl name="parChTrans2D2">
+    <dgm:fillClrLst meth="repeat">
+      <a:schemeClr val="accent1"/>
+    </dgm:fillClrLst>
+    <dgm:linClrLst meth="repeat">
+      <a:schemeClr val="accent1"/>
+    </dgm:linClrLst>
+    <dgm:effectClrLst/>
+    <dgm:txLinClrLst/>
+    <dgm:txFillClrLst meth="repeat">
+      <a:schemeClr val="lt1"/>
+    </dgm:txFillClrLst>
+    <dgm:txEffectClrLst/>
+  </dgm:styleLbl>
+  <dgm:styleLbl name="parChTrans2D3">
+    <dgm:fillClrLst meth="repeat">
+      <a:schemeClr val="accent1"/>
+    </dgm:fillClrLst>
+    <dgm:linClrLst meth="repeat">
+      <a:schemeClr val="accent1"/>
+    </dgm:linClrLst>
+    <dgm:effectClrLst/>
+    <dgm:txLinClrLst/>
+    <dgm:txFillClrLst meth="repeat">
+      <a:schemeClr val="lt1"/>
+    </dgm:txFillClrLst>
+    <dgm:txEffectClrLst/>
+  </dgm:styleLbl>
+  <dgm:styleLbl name="parChTrans2D4">
+    <dgm:fillClrLst meth="repeat">
+      <a:schemeClr val="accent1"/>
+    </dgm:fillClrLst>
+    <dgm:linClrLst meth="repeat">
+      <a:schemeClr val="accent1"/>
+    </dgm:linClrLst>
+    <dgm:effectClrLst/>
+    <dgm:txLinClrLst/>
+    <dgm:txFillClrLst meth="repeat">
+      <a:schemeClr val="lt1"/>
+    </dgm:txFillClrLst>
+    <dgm:txEffectClrLst/>
+  </dgm:styleLbl>
+  <dgm:styleLbl name="parChTrans1D1">
+    <dgm:fillClrLst meth="repeat">
+      <a:schemeClr val="accent1"/>
+    </dgm:fillClrLst>
+    <dgm:linClrLst meth="repeat">
+      <a:schemeClr val="accent1">
+        <a:shade val="60000"/>
+      </a:schemeClr>
+    </dgm:linClrLst>
+    <dgm:effectClrLst/>
+    <dgm:txLinClrLst/>
+    <dgm:txFillClrLst meth="repeat">
+      <a:schemeClr val="tx1"/>
+    </dgm:txFillClrLst>
+    <dgm:txEffectClrLst/>
+  </dgm:styleLbl>
+  <dgm:styleLbl name="parChTrans1D2">
+    <dgm:fillClrLst meth="repeat">
+      <a:schemeClr val="accent1"/>
+    </dgm:fillClrLst>
+    <dgm:linClrLst meth="repeat">
+      <a:schemeClr val="accent1">
+        <a:shade val="60000"/>
+      </a:schemeClr>
+    </dgm:linClrLst>
+    <dgm:effectClrLst/>
+    <dgm:txLinClrLst/>
+    <dgm:txFillClrLst meth="repeat">
+      <a:schemeClr val="tx1"/>
+    </dgm:txFillClrLst>
+    <dgm:txEffectClrLst/>
+  </dgm:styleLbl>
+  <dgm:styleLbl name="parChTrans1D3">
+    <dgm:fillClrLst meth="repeat">
+      <a:schemeClr val="accent1"/>
+    </dgm:fillClrLst>
+    <dgm:linClrLst meth="repeat">
+      <a:schemeClr val="accent1">
+        <a:shade val="80000"/>
+      </a:schemeClr>
+    </dgm:linClrLst>
+    <dgm:effectClrLst/>
+    <dgm:txLinClrLst/>
+    <dgm:txFillClrLst meth="repeat">
+      <a:schemeClr val="tx1"/>
+    </dgm:txFillClrLst>
+    <dgm:txEffectClrLst/>
+  </dgm:styleLbl>
+  <dgm:styleLbl name="parChTrans1D4">
+    <dgm:fillClrLst meth="repeat">
+      <a:schemeClr val="accent1"/>
+    </dgm:fillClrLst>
+    <dgm:linClrLst meth="repeat">
+      <a:schemeClr val="accent1">
+        <a:shade val="80000"/>
+      </a:schemeClr>
+    </dgm:linClrLst>
+    <dgm:effectClrLst/>
+    <dgm:txLinClrLst/>
+    <dgm:txFillClrLst meth="repeat">
+      <a:schemeClr val="tx1"/>
+    </dgm:txFillClrLst>
+    <dgm:txEffectClrLst/>
+  </dgm:styleLbl>
+  <dgm:styleLbl name="fgAcc1">
+    <dgm:fillClrLst meth="repeat">
+      <a:schemeClr val="lt1">
+        <a:alpha val="90000"/>
+      </a:schemeClr>
+    </dgm:fillClrLst>
+    <dgm:linClrLst meth="repeat">
+      <a:schemeClr val="accent1"/>
+    </dgm:linClrLst>
+    <dgm:effectClrLst/>
+    <dgm:txLinClrLst/>
+    <dgm:txFillClrLst meth="repeat">
+      <a:schemeClr val="dk1"/>
+    </dgm:txFillClrLst>
+    <dgm:txEffectClrLst/>
+  </dgm:styleLbl>
+  <dgm:styleLbl name="conFgAcc1">
+    <dgm:fillClrLst meth="repeat">
+      <a:schemeClr val="lt1">
+        <a:alpha val="90000"/>
+      </a:schemeClr>
+    </dgm:fillClrLst>
+    <dgm:linClrLst meth="repeat">
+      <a:schemeClr val="accent1"/>
+    </dgm:linClrLst>
+    <dgm:effectClrLst/>
+    <dgm:txLinClrLst/>
+    <dgm:txFillClrLst meth="repeat">
+      <a:schemeClr val="dk1"/>
+    </dgm:txFillClrLst>
+    <dgm:txEffectClrLst/>
+  </dgm:styleLbl>
+  <dgm:styleLbl name="alignAcc1">
+    <dgm:fillClrLst meth="repeat">
+      <a:schemeClr val="lt1">
+        <a:alpha val="90000"/>
+      </a:schemeClr>
+    </dgm:fillClrLst>
+    <dgm:linClrLst meth="repeat">
+      <a:schemeClr val="accent1"/>
+    </dgm:linClrLst>
+    <dgm:effectClrLst/>
+    <dgm:txLinClrLst/>
+    <dgm:txFillClrLst meth="repeat">
+      <a:schemeClr val="dk1"/>
+    </dgm:txFillClrLst>
+    <dgm:txEffectClrLst/>
+  </dgm:styleLbl>
+  <dgm:styleLbl name="trAlignAcc1">
+    <dgm:fillClrLst meth="repeat">
+      <a:schemeClr val="lt1">
+        <a:alpha val="40000"/>
+      </a:schemeClr>
+    </dgm:fillClrLst>
+    <dgm:linClrLst meth="repeat">
+      <a:schemeClr val="accent1"/>
+    </dgm:linClrLst>
+    <dgm:effectClrLst/>
+    <dgm:txLinClrLst/>
+    <dgm:txFillClrLst meth="repeat">
+      <a:schemeClr val="dk1"/>
+    </dgm:txFillClrLst>
+    <dgm:txEffectClrLst/>
+  </dgm:styleLbl>
+  <dgm:styleLbl name="bgAcc1">
+    <dgm:fillClrLst meth="repeat">
+      <a:schemeClr val="lt1">
+        <a:alpha val="90000"/>
+      </a:schemeClr>
+    </dgm:fillClrLst>
+    <dgm:linClrLst meth="repeat">
+      <a:schemeClr val="accent1"/>
+    </dgm:linClrLst>
+    <dgm:effectClrLst/>
+    <dgm:txLinClrLst/>
+    <dgm:txFillClrLst meth="repeat">
+      <a:schemeClr val="dk1"/>
+    </dgm:txFillClrLst>
+    <dgm:txEffectClrLst/>
+  </dgm:styleLbl>
+  <dgm:styleLbl name="solidFgAcc1">
+    <dgm:fillClrLst meth="repeat">
+      <a:schemeClr val="lt1"/>
+    </dgm:fillClrLst>
+    <dgm:linClrLst meth="repeat">
+      <a:schemeClr val="accent1"/>
+    </dgm:linClrLst>
+    <dgm:effectClrLst/>
+    <dgm:txLinClrLst/>
+    <dgm:txFillClrLst meth="repeat">
+      <a:schemeClr val="dk1"/>
+    </dgm:txFillClrLst>
+    <dgm:txEffectClrLst/>
+  </dgm:styleLbl>
+  <dgm:styleLbl name="solidAlignAcc1">
+    <dgm:fillClrLst meth="repeat">
+      <a:schemeClr val="lt1"/>
+    </dgm:fillClrLst>
+    <dgm:linClrLst meth="repeat">
+      <a:schemeClr val="accent1"/>
+    </dgm:linClrLst>
+    <dgm:effectClrLst/>
+    <dgm:txLinClrLst/>
+    <dgm:txFillClrLst meth="repeat">
+      <a:schemeClr val="dk1"/>
+    </dgm:txFillClrLst>
+    <dgm:txEffectClrLst/>
+  </dgm:styleLbl>
+  <dgm:styleLbl name="solidBgAcc1">
+    <dgm:fillClrLst meth="repeat">
+      <a:schemeClr val="lt1"/>
+    </dgm:fillClrLst>
+    <dgm:linClrLst meth="repeat">
+      <a:schemeClr val="accent1"/>
+    </dgm:linClrLst>
+    <dgm:effectClrLst/>
+    <dgm:txLinClrLst/>
+    <dgm:txFillClrLst meth="repeat">
+      <a:schemeClr val="dk1"/>
+    </dgm:txFillClrLst>
+    <dgm:txEffectClrLst/>
+  </dgm:styleLbl>
+  <dgm:styleLbl name="fgAccFollowNode1">
+    <dgm:fillClrLst meth="repeat">
+      <a:schemeClr val="accent1">
+        <a:alpha val="90000"/>
+        <a:tint val="40000"/>
+      </a:schemeClr>
+    </dgm:fillClrLst>
+    <dgm:linClrLst meth="repeat">
+      <a:schemeClr val="accent1">
+        <a:alpha val="90000"/>
+        <a:tint val="40000"/>
+      </a:schemeClr>
+    </dgm:linClrLst>
+    <dgm:effectClrLst/>
+    <dgm:txLinClrLst/>
+    <dgm:txFillClrLst meth="repeat">
+      <a:schemeClr val="dk1"/>
+    </dgm:txFillClrLst>
+    <dgm:txEffectClrLst/>
+  </dgm:styleLbl>
+  <dgm:styleLbl name="alignAccFollowNode1">
+    <dgm:fillClrLst meth="repeat">
+      <a:schemeClr val="accent1">
+        <a:alpha val="90000"/>
+        <a:tint val="40000"/>
+      </a:schemeClr>
+    </dgm:fillClrLst>
+    <dgm:linClrLst meth="repeat">
+      <a:schemeClr val="accent1">
+        <a:alpha val="90000"/>
+        <a:tint val="40000"/>
+      </a:schemeClr>
+    </dgm:linClrLst>
+    <dgm:effectClrLst/>
+    <dgm:txLinClrLst/>
+    <dgm:txFillClrLst meth="repeat">
+      <a:schemeClr val="dk1"/>
+    </dgm:txFillClrLst>
+    <dgm:txEffectClrLst/>
+  </dgm:styleLbl>
+  <dgm:styleLbl name="bgAccFollowNode1">
+    <dgm:fillClrLst meth="repeat">
+      <a:schemeClr val="accent1">
+        <a:alpha val="90000"/>
+        <a:tint val="40000"/>
+      </a:schemeClr>
+    </dgm:fillClrLst>
+    <dgm:linClrLst meth="repeat">
+      <a:schemeClr val="accent1">
+        <a:alpha val="90000"/>
+        <a:tint val="40000"/>
+      </a:schemeClr>
+    </dgm:linClrLst>
+    <dgm:effectClrLst/>
+    <dgm:txLinClrLst/>
+    <dgm:txFillClrLst meth="repeat">
+      <a:schemeClr val="dk1"/>
+    </dgm:txFillClrLst>
+    <dgm:txEffectClrLst/>
+  </dgm:styleLbl>
+  <dgm:styleLbl name="fgAcc0">
+    <dgm:fillClrLst meth="repeat">
+      <a:schemeClr val="lt1">
+        <a:alpha val="90000"/>
+      </a:schemeClr>
+    </dgm:fillClrLst>
+    <dgm:linClrLst meth="repeat">
+      <a:schemeClr val="accent1"/>
+    </dgm:linClrLst>
+    <dgm:effectClrLst/>
+    <dgm:txLinClrLst/>
+    <dgm:txFillClrLst meth="repeat">
+      <a:schemeClr val="dk1"/>
+    </dgm:txFillClrLst>
+    <dgm:txEffectClrLst/>
+  </dgm:styleLbl>
+  <dgm:styleLbl name="fgAcc2">
+    <dgm:fillClrLst meth="repeat">
+      <a:schemeClr val="lt1">
+        <a:alpha val="90000"/>
+      </a:schemeClr>
+    </dgm:fillClrLst>
+    <dgm:linClrLst meth="repeat">
+      <a:schemeClr val="accent1"/>
+    </dgm:linClrLst>
+    <dgm:effectClrLst/>
+    <dgm:txLinClrLst/>
+    <dgm:txFillClrLst meth="repeat">
+      <a:schemeClr val="dk1"/>
+    </dgm:txFillClrLst>
+    <dgm:txEffectClrLst/>
+  </dgm:styleLbl>
+  <dgm:styleLbl name="fgAcc3">
+    <dgm:fillClrLst meth="repeat">
+      <a:schemeClr val="lt1">
+        <a:alpha val="90000"/>
+      </a:schemeClr>
+    </dgm:fillClrLst>
+    <dgm:linClrLst meth="repeat">
+      <a:schemeClr val="accent1"/>
+    </dgm:linClrLst>
+    <dgm:effectClrLst/>
+    <dgm:txLinClrLst/>
+    <dgm:txFillClrLst meth="repeat">
+      <a:schemeClr val="dk1"/>
+    </dgm:txFillClrLst>
+    <dgm:txEffectClrLst/>
+  </dgm:styleLbl>
+  <dgm:styleLbl name="fgAcc4">
+    <dgm:fillClrLst meth="repeat">
+      <a:schemeClr val="lt1">
+        <a:alpha val="90000"/>
+      </a:schemeClr>
+    </dgm:fillClrLst>
+    <dgm:linClrLst meth="repeat">
+      <a:schemeClr val="accent1"/>
+    </dgm:linClrLst>
+    <dgm:effectClrLst/>
+    <dgm:txLinClrLst/>
+    <dgm:txFillClrLst meth="repeat">
+      <a:schemeClr val="dk1"/>
+    </dgm:txFillClrLst>
+    <dgm:txEffectClrLst/>
+  </dgm:styleLbl>
+  <dgm:styleLbl name="bgShp">
+    <dgm:fillClrLst meth="repeat">
+      <a:schemeClr val="accent1">
+        <a:tint val="40000"/>
+      </a:schemeClr>
+    </dgm:fillClrLst>
+    <dgm:linClrLst meth="repeat">
+      <a:schemeClr val="accent1"/>
+    </dgm:linClrLst>
+    <dgm:effectClrLst/>
+    <dgm:txLinClrLst/>
+    <dgm:txFillClrLst meth="repeat">
+      <a:schemeClr val="dk1"/>
+    </dgm:txFillClrLst>
+    <dgm:txEffectClrLst/>
+  </dgm:styleLbl>
+  <dgm:styleLbl name="dkBgShp">
+    <dgm:fillClrLst meth="repeat">
+      <a:schemeClr val="accent1">
+        <a:shade val="80000"/>
+      </a:schemeClr>
+    </dgm:fillClrLst>
+    <dgm:linClrLst meth="repeat">
+      <a:schemeClr val="accent1"/>
+    </dgm:linClrLst>
+    <dgm:effectClrLst/>
+    <dgm:txLinClrLst/>
+    <dgm:txFillClrLst meth="repeat">
+      <a:schemeClr val="lt1"/>
+    </dgm:txFillClrLst>
+    <dgm:txEffectClrLst/>
+  </dgm:styleLbl>
+  <dgm:styleLbl name="trBgShp">
+    <dgm:fillClrLst meth="repeat">
+      <a:schemeClr val="accent1">
+        <a:tint val="50000"/>
+        <a:alpha val="40000"/>
+      </a:schemeClr>
+    </dgm:fillClrLst>
+    <dgm:linClrLst meth="repeat">
+      <a:schemeClr val="accent1"/>
+    </dgm:linClrLst>
+    <dgm:effectClrLst/>
+    <dgm:txLinClrLst/>
+    <dgm:txFillClrLst meth="repeat">
+      <a:schemeClr val="lt1"/>
+    </dgm:txFillClrLst>
+    <dgm:txEffectClrLst/>
+  </dgm:styleLbl>
+  <dgm:styleLbl name="fgShp">
+    <dgm:fillClrLst meth="repeat">
+      <a:schemeClr val="accent1">
+        <a:tint val="60000"/>
+      </a:schemeClr>
+    </dgm:fillClrLst>
+    <dgm:linClrLst meth="repeat">
+      <a:schemeClr val="lt1"/>
+    </dgm:linClrLst>
+    <dgm:effectClrLst/>
+    <dgm:txLinClrLst/>
+    <dgm:txFillClrLst meth="repeat">
+      <a:schemeClr val="dk1"/>
+    </dgm:txFillClrLst>
+    <dgm:txEffectClrLst/>
+  </dgm:styleLbl>
+  <dgm:styleLbl name="revTx">
+    <dgm:fillClrLst meth="repeat">
+      <a:schemeClr val="lt1">
+        <a:alpha val="0"/>
+      </a:schemeClr>
+    </dgm:fillClrLst>
+    <dgm:linClrLst meth="repeat">
+      <a:schemeClr val="dk1">
+        <a:alpha val="0"/>
+      </a:schemeClr>
+    </dgm:linClrLst>
+    <dgm:effectClrLst/>
+    <dgm:txLinClrLst/>
+    <dgm:txFillClrLst meth="repeat">
+      <a:schemeClr val="tx1"/>
+    </dgm:txFillClrLst>
+    <dgm:txEffectClrLst/>
+  </dgm:styleLbl>
+</dgm:colorsDef>
+</file>
+
 <file path=ppt/diagrams/data1.xml><?xml version="1.0" encoding="utf-8"?>
+<dgm:dataModel xmlns:dgm="http://schemas.openxmlformats.org/drawingml/2006/diagram" xmlns:a="http://schemas.openxmlformats.org/drawingml/2006/main">
+  <dgm:ptLst>
+    <dgm:pt modelId="{2A136A90-6B59-45AD-BBA1-85AFD032E8F8}" type="doc">
+      <dgm:prSet loTypeId="urn:microsoft.com/office/officeart/2005/8/layout/list1" loCatId="list" qsTypeId="urn:microsoft.com/office/officeart/2005/8/quickstyle/simple1" qsCatId="simple" csTypeId="urn:microsoft.com/office/officeart/2005/8/colors/accent1_2" csCatId="accent1" phldr="1"/>
+      <dgm:spPr/>
+      <dgm:t>
+        <a:bodyPr rtlCol="0"/>
+        <a:lstStyle/>
+        <a:p>
+          <a:pPr rtl="0"/>
+          <a:endParaRPr lang="en-US"/>
+        </a:p>
+      </dgm:t>
+    </dgm:pt>
+    <dgm:pt modelId="{A533B6C7-3203-4AEE-95BC-E867D49C88B5}">
+      <dgm:prSet phldrT="[Text]"/>
+      <dgm:spPr>
+        <a:solidFill>
+          <a:schemeClr val="accent2"/>
+        </a:solidFill>
+      </dgm:spPr>
+      <dgm:t>
+        <a:bodyPr rtlCol="0"/>
+        <a:lstStyle/>
+        <a:p>
+          <a:pPr rtl="0"/>
+          <a:r>
+            <a:rPr lang="es-ES" noProof="0" dirty="0">
+              <a:latin typeface="Tahoma" panose="020B0604030504040204" pitchFamily="34" charset="0"/>
+              <a:ea typeface="Tahoma" panose="020B0604030504040204" pitchFamily="34" charset="0"/>
+              <a:cs typeface="Tahoma" panose="020B0604030504040204" pitchFamily="34" charset="0"/>
+            </a:rPr>
+            <a:t>Pérdida: 40%</a:t>
+          </a:r>
+        </a:p>
+      </dgm:t>
+    </dgm:pt>
+    <dgm:pt modelId="{4FCAF1A9-8A97-45AC-B4A5-B91AEE5BC9BB}" type="parTrans" cxnId="{0FE563DE-8338-4B45-BCFD-251C8642CABA}">
+      <dgm:prSet/>
+      <dgm:spPr/>
+      <dgm:t>
+        <a:bodyPr rtlCol="0"/>
+        <a:lstStyle/>
+        <a:p>
+          <a:pPr rtl="0"/>
+          <a:endParaRPr lang="es-ES" noProof="0" dirty="0"/>
+        </a:p>
+      </dgm:t>
+    </dgm:pt>
+    <dgm:pt modelId="{634EAA8A-B09B-42FE-8301-99FBFB2B9BD8}" type="sibTrans" cxnId="{0FE563DE-8338-4B45-BCFD-251C8642CABA}">
+      <dgm:prSet/>
+      <dgm:spPr/>
+      <dgm:t>
+        <a:bodyPr rtlCol="0"/>
+        <a:lstStyle/>
+        <a:p>
+          <a:pPr rtl="0"/>
+          <a:endParaRPr lang="es-ES" noProof="0" dirty="0"/>
+        </a:p>
+      </dgm:t>
+    </dgm:pt>
+    <dgm:pt modelId="{67C52F66-F082-47AC-B005-94F9C6523B64}">
+      <dgm:prSet phldrT="[Text]"/>
+      <dgm:spPr>
+        <a:solidFill>
+          <a:schemeClr val="accent5">
+            <a:lumMod val="50000"/>
+          </a:schemeClr>
+        </a:solidFill>
+      </dgm:spPr>
+      <dgm:t>
+        <a:bodyPr rtlCol="0"/>
+        <a:lstStyle/>
+        <a:p>
+          <a:pPr rtl="0"/>
+          <a:r>
+            <a:rPr lang="es-ES" noProof="0" dirty="0">
+              <a:latin typeface="Tahoma" panose="020B0604030504040204" pitchFamily="34" charset="0"/>
+              <a:ea typeface="Tahoma" panose="020B0604030504040204" pitchFamily="34" charset="0"/>
+              <a:cs typeface="Tahoma" panose="020B0604030504040204" pitchFamily="34" charset="0"/>
+            </a:rPr>
+            <a:t>Precisión: 87%</a:t>
+          </a:r>
+        </a:p>
+      </dgm:t>
+    </dgm:pt>
+    <dgm:pt modelId="{B6CFE873-8637-47EC-924E-918BC1659F5E}" type="parTrans" cxnId="{DC63A9FA-C467-48A1-9F83-F388EC063046}">
+      <dgm:prSet/>
+      <dgm:spPr/>
+      <dgm:t>
+        <a:bodyPr/>
+        <a:lstStyle/>
+        <a:p>
+          <a:endParaRPr lang="es-GT"/>
+        </a:p>
+      </dgm:t>
+    </dgm:pt>
+    <dgm:pt modelId="{C7FE7FB8-DB85-4B7C-85FA-221DA2B424F3}" type="sibTrans" cxnId="{DC63A9FA-C467-48A1-9F83-F388EC063046}">
+      <dgm:prSet/>
+      <dgm:spPr/>
+      <dgm:t>
+        <a:bodyPr/>
+        <a:lstStyle/>
+        <a:p>
+          <a:endParaRPr lang="es-GT"/>
+        </a:p>
+      </dgm:t>
+    </dgm:pt>
+    <dgm:pt modelId="{183A34DF-AA92-49E1-8191-0CF6AD17A6AA}" type="pres">
+      <dgm:prSet presAssocID="{2A136A90-6B59-45AD-BBA1-85AFD032E8F8}" presName="linear" presStyleCnt="0">
+        <dgm:presLayoutVars>
+          <dgm:dir/>
+          <dgm:animLvl val="lvl"/>
+          <dgm:resizeHandles val="exact"/>
+        </dgm:presLayoutVars>
+      </dgm:prSet>
+      <dgm:spPr/>
+    </dgm:pt>
+    <dgm:pt modelId="{CA34FEEF-6F4A-44BD-AD4F-496B54C24196}" type="pres">
+      <dgm:prSet presAssocID="{67C52F66-F082-47AC-B005-94F9C6523B64}" presName="parentLin" presStyleCnt="0"/>
+      <dgm:spPr/>
+    </dgm:pt>
+    <dgm:pt modelId="{969FAA05-4E90-40DD-844B-B1414BFEEF46}" type="pres">
+      <dgm:prSet presAssocID="{67C52F66-F082-47AC-B005-94F9C6523B64}" presName="parentLeftMargin" presStyleLbl="node1" presStyleIdx="0" presStyleCnt="2"/>
+      <dgm:spPr/>
+    </dgm:pt>
+    <dgm:pt modelId="{B30E9D7C-1B64-4C61-9997-E0F0919FFEBE}" type="pres">
+      <dgm:prSet presAssocID="{67C52F66-F082-47AC-B005-94F9C6523B64}" presName="parentText" presStyleLbl="node1" presStyleIdx="0" presStyleCnt="2">
+        <dgm:presLayoutVars>
+          <dgm:chMax val="0"/>
+          <dgm:bulletEnabled val="1"/>
+        </dgm:presLayoutVars>
+      </dgm:prSet>
+      <dgm:spPr/>
+    </dgm:pt>
+    <dgm:pt modelId="{6E90D916-6936-40DC-AE50-5E9797653EA3}" type="pres">
+      <dgm:prSet presAssocID="{67C52F66-F082-47AC-B005-94F9C6523B64}" presName="negativeSpace" presStyleCnt="0"/>
+      <dgm:spPr/>
+    </dgm:pt>
+    <dgm:pt modelId="{F3B8974D-7792-4B0B-903B-F862CD925E0B}" type="pres">
+      <dgm:prSet presAssocID="{67C52F66-F082-47AC-B005-94F9C6523B64}" presName="childText" presStyleLbl="conFgAcc1" presStyleIdx="0" presStyleCnt="2">
+        <dgm:presLayoutVars>
+          <dgm:bulletEnabled val="1"/>
+        </dgm:presLayoutVars>
+      </dgm:prSet>
+      <dgm:spPr/>
+    </dgm:pt>
+    <dgm:pt modelId="{1C17C9EE-575B-4D73-AA8E-AC6EE9A27B0C}" type="pres">
+      <dgm:prSet presAssocID="{C7FE7FB8-DB85-4B7C-85FA-221DA2B424F3}" presName="spaceBetweenRectangles" presStyleCnt="0"/>
+      <dgm:spPr/>
+    </dgm:pt>
+    <dgm:pt modelId="{77070C8B-4365-4FE5-A117-9CDBA9EA1B7B}" type="pres">
+      <dgm:prSet presAssocID="{A533B6C7-3203-4AEE-95BC-E867D49C88B5}" presName="parentLin" presStyleCnt="0"/>
+      <dgm:spPr/>
+    </dgm:pt>
+    <dgm:pt modelId="{1281A6D2-5A4B-4B28-A324-2451A8523897}" type="pres">
+      <dgm:prSet presAssocID="{A533B6C7-3203-4AEE-95BC-E867D49C88B5}" presName="parentLeftMargin" presStyleLbl="node1" presStyleIdx="0" presStyleCnt="2"/>
+      <dgm:spPr/>
+    </dgm:pt>
+    <dgm:pt modelId="{9F236B2A-6433-401D-953E-FC86D923A3BE}" type="pres">
+      <dgm:prSet presAssocID="{A533B6C7-3203-4AEE-95BC-E867D49C88B5}" presName="parentText" presStyleLbl="node1" presStyleIdx="1" presStyleCnt="2">
+        <dgm:presLayoutVars>
+          <dgm:chMax val="0"/>
+          <dgm:bulletEnabled val="1"/>
+        </dgm:presLayoutVars>
+      </dgm:prSet>
+      <dgm:spPr/>
+    </dgm:pt>
+    <dgm:pt modelId="{622D5052-0558-4614-99B8-0AD5AD5D765D}" type="pres">
+      <dgm:prSet presAssocID="{A533B6C7-3203-4AEE-95BC-E867D49C88B5}" presName="negativeSpace" presStyleCnt="0"/>
+      <dgm:spPr/>
+    </dgm:pt>
+    <dgm:pt modelId="{87E2FD7C-0729-47B8-B1FB-A44E439BE764}" type="pres">
+      <dgm:prSet presAssocID="{A533B6C7-3203-4AEE-95BC-E867D49C88B5}" presName="childText" presStyleLbl="conFgAcc1" presStyleIdx="1" presStyleCnt="2">
+        <dgm:presLayoutVars>
+          <dgm:bulletEnabled val="1"/>
+        </dgm:presLayoutVars>
+      </dgm:prSet>
+      <dgm:spPr>
+        <a:ln>
+          <a:solidFill>
+            <a:schemeClr val="accent2"/>
+          </a:solidFill>
+        </a:ln>
+      </dgm:spPr>
+    </dgm:pt>
+  </dgm:ptLst>
+  <dgm:cxnLst>
+    <dgm:cxn modelId="{72FBC52A-80BD-4D8D-8201-EC70459479E5}" type="presOf" srcId="{A533B6C7-3203-4AEE-95BC-E867D49C88B5}" destId="{9F236B2A-6433-401D-953E-FC86D923A3BE}" srcOrd="1" destOrd="0" presId="urn:microsoft.com/office/officeart/2005/8/layout/list1"/>
+    <dgm:cxn modelId="{AE191E4D-5CAB-4318-B26C-FF45842DE147}" type="presOf" srcId="{A533B6C7-3203-4AEE-95BC-E867D49C88B5}" destId="{1281A6D2-5A4B-4B28-A324-2451A8523897}" srcOrd="0" destOrd="0" presId="urn:microsoft.com/office/officeart/2005/8/layout/list1"/>
+    <dgm:cxn modelId="{8028E8BF-8455-4118-B99A-A0686340C34D}" type="presOf" srcId="{2A136A90-6B59-45AD-BBA1-85AFD032E8F8}" destId="{183A34DF-AA92-49E1-8191-0CF6AD17A6AA}" srcOrd="0" destOrd="0" presId="urn:microsoft.com/office/officeart/2005/8/layout/list1"/>
+    <dgm:cxn modelId="{0FE563DE-8338-4B45-BCFD-251C8642CABA}" srcId="{2A136A90-6B59-45AD-BBA1-85AFD032E8F8}" destId="{A533B6C7-3203-4AEE-95BC-E867D49C88B5}" srcOrd="1" destOrd="0" parTransId="{4FCAF1A9-8A97-45AC-B4A5-B91AEE5BC9BB}" sibTransId="{634EAA8A-B09B-42FE-8301-99FBFB2B9BD8}"/>
+    <dgm:cxn modelId="{4E5125EC-80B8-4933-A10B-23962A9C6D9D}" type="presOf" srcId="{67C52F66-F082-47AC-B005-94F9C6523B64}" destId="{969FAA05-4E90-40DD-844B-B1414BFEEF46}" srcOrd="0" destOrd="0" presId="urn:microsoft.com/office/officeart/2005/8/layout/list1"/>
+    <dgm:cxn modelId="{5C4C4DF6-BC98-4DD1-ACB8-8FC536D318D6}" type="presOf" srcId="{67C52F66-F082-47AC-B005-94F9C6523B64}" destId="{B30E9D7C-1B64-4C61-9997-E0F0919FFEBE}" srcOrd="1" destOrd="0" presId="urn:microsoft.com/office/officeart/2005/8/layout/list1"/>
+    <dgm:cxn modelId="{DC63A9FA-C467-48A1-9F83-F388EC063046}" srcId="{2A136A90-6B59-45AD-BBA1-85AFD032E8F8}" destId="{67C52F66-F082-47AC-B005-94F9C6523B64}" srcOrd="0" destOrd="0" parTransId="{B6CFE873-8637-47EC-924E-918BC1659F5E}" sibTransId="{C7FE7FB8-DB85-4B7C-85FA-221DA2B424F3}"/>
+    <dgm:cxn modelId="{B3A5EF4F-CA1F-461F-B812-6237966584F9}" type="presParOf" srcId="{183A34DF-AA92-49E1-8191-0CF6AD17A6AA}" destId="{CA34FEEF-6F4A-44BD-AD4F-496B54C24196}" srcOrd="0" destOrd="0" presId="urn:microsoft.com/office/officeart/2005/8/layout/list1"/>
+    <dgm:cxn modelId="{20FF003B-CC09-40FD-88D1-140DD83D28AD}" type="presParOf" srcId="{CA34FEEF-6F4A-44BD-AD4F-496B54C24196}" destId="{969FAA05-4E90-40DD-844B-B1414BFEEF46}" srcOrd="0" destOrd="0" presId="urn:microsoft.com/office/officeart/2005/8/layout/list1"/>
+    <dgm:cxn modelId="{D0681C9C-753D-45F4-82F4-ADFB5B1216B5}" type="presParOf" srcId="{CA34FEEF-6F4A-44BD-AD4F-496B54C24196}" destId="{B30E9D7C-1B64-4C61-9997-E0F0919FFEBE}" srcOrd="1" destOrd="0" presId="urn:microsoft.com/office/officeart/2005/8/layout/list1"/>
+    <dgm:cxn modelId="{CC5FC6F0-D728-4B24-9896-48B7BD593CCC}" type="presParOf" srcId="{183A34DF-AA92-49E1-8191-0CF6AD17A6AA}" destId="{6E90D916-6936-40DC-AE50-5E9797653EA3}" srcOrd="1" destOrd="0" presId="urn:microsoft.com/office/officeart/2005/8/layout/list1"/>
+    <dgm:cxn modelId="{78D1C962-251F-4374-B6B6-27EF429C29F1}" type="presParOf" srcId="{183A34DF-AA92-49E1-8191-0CF6AD17A6AA}" destId="{F3B8974D-7792-4B0B-903B-F862CD925E0B}" srcOrd="2" destOrd="0" presId="urn:microsoft.com/office/officeart/2005/8/layout/list1"/>
+    <dgm:cxn modelId="{98D3BEDD-27D1-4A27-B3F3-698519BF8206}" type="presParOf" srcId="{183A34DF-AA92-49E1-8191-0CF6AD17A6AA}" destId="{1C17C9EE-575B-4D73-AA8E-AC6EE9A27B0C}" srcOrd="3" destOrd="0" presId="urn:microsoft.com/office/officeart/2005/8/layout/list1"/>
+    <dgm:cxn modelId="{FF7413D7-D548-4681-A585-70D1AABC67F9}" type="presParOf" srcId="{183A34DF-AA92-49E1-8191-0CF6AD17A6AA}" destId="{77070C8B-4365-4FE5-A117-9CDBA9EA1B7B}" srcOrd="4" destOrd="0" presId="urn:microsoft.com/office/officeart/2005/8/layout/list1"/>
+    <dgm:cxn modelId="{71A0FD2B-4499-4733-9591-DA4C05395BCE}" type="presParOf" srcId="{77070C8B-4365-4FE5-A117-9CDBA9EA1B7B}" destId="{1281A6D2-5A4B-4B28-A324-2451A8523897}" srcOrd="0" destOrd="0" presId="urn:microsoft.com/office/officeart/2005/8/layout/list1"/>
+    <dgm:cxn modelId="{30A09A04-D072-417D-A61D-934C676DCDCF}" type="presParOf" srcId="{77070C8B-4365-4FE5-A117-9CDBA9EA1B7B}" destId="{9F236B2A-6433-401D-953E-FC86D923A3BE}" srcOrd="1" destOrd="0" presId="urn:microsoft.com/office/officeart/2005/8/layout/list1"/>
+    <dgm:cxn modelId="{524522B1-B159-42B4-B665-C9379A55DCC7}" type="presParOf" srcId="{183A34DF-AA92-49E1-8191-0CF6AD17A6AA}" destId="{622D5052-0558-4614-99B8-0AD5AD5D765D}" srcOrd="5" destOrd="0" presId="urn:microsoft.com/office/officeart/2005/8/layout/list1"/>
+    <dgm:cxn modelId="{E7BEC372-D400-47C9-A797-96ADB89A1753}" type="presParOf" srcId="{183A34DF-AA92-49E1-8191-0CF6AD17A6AA}" destId="{87E2FD7C-0729-47B8-B1FB-A44E439BE764}" srcOrd="6" destOrd="0" presId="urn:microsoft.com/office/officeart/2005/8/layout/list1"/>
+  </dgm:cxnLst>
+  <dgm:bg/>
+  <dgm:whole/>
+  <dgm:extLst>
+    <a:ext uri="http://schemas.microsoft.com/office/drawing/2008/diagram">
+      <dsp:dataModelExt xmlns:dsp="http://schemas.microsoft.com/office/drawing/2008/diagram" relId="rId9" minVer="http://schemas.openxmlformats.org/drawingml/2006/diagram"/>
+    </a:ext>
+    <a:ext uri="{C62137D5-CB1D-491B-B009-E17868A290BF}">
+      <dgm14:recolorImg xmlns:dgm14="http://schemas.microsoft.com/office/drawing/2010/diagram" val="1"/>
+    </a:ext>
+  </dgm:extLst>
+</dgm:dataModel>
+</file>
+
+<file path=ppt/diagrams/data2.xml><?xml version="1.0" encoding="utf-8"?>
 <dgm:dataModel xmlns:dgm="http://schemas.openxmlformats.org/drawingml/2006/diagram" xmlns:a="http://schemas.openxmlformats.org/drawingml/2006/main">
   <dgm:ptLst>
     <dgm:pt modelId="{2A136A90-6B59-45AD-BBA1-85AFD032E8F8}" type="doc">
@@ -1107,6 +2077,267 @@
 </file>
 
 <file path=ppt/diagrams/drawing1.xml><?xml version="1.0" encoding="utf-8"?>
+<dsp:drawing xmlns:dgm="http://schemas.openxmlformats.org/drawingml/2006/diagram" xmlns:dsp="http://schemas.microsoft.com/office/drawing/2008/diagram" xmlns:a="http://schemas.openxmlformats.org/drawingml/2006/main">
+  <dsp:spTree>
+    <dsp:nvGrpSpPr>
+      <dsp:cNvPr id="0" name=""/>
+      <dsp:cNvGrpSpPr/>
+    </dsp:nvGrpSpPr>
+    <dsp:grpSpPr/>
+    <dsp:sp modelId="{F3B8974D-7792-4B0B-903B-F862CD925E0B}">
+      <dsp:nvSpPr>
+        <dsp:cNvPr id="0" name=""/>
+        <dsp:cNvSpPr/>
+      </dsp:nvSpPr>
+      <dsp:spPr>
+        <a:xfrm>
+          <a:off x="0" y="734035"/>
+          <a:ext cx="6994333" cy="1209600"/>
+        </a:xfrm>
+        <a:prstGeom prst="rect">
+          <a:avLst/>
+        </a:prstGeom>
+        <a:solidFill>
+          <a:schemeClr val="lt1">
+            <a:alpha val="90000"/>
+            <a:hueOff val="0"/>
+            <a:satOff val="0"/>
+            <a:lumOff val="0"/>
+            <a:alphaOff val="0"/>
+          </a:schemeClr>
+        </a:solidFill>
+        <a:ln w="12700" cap="flat" cmpd="sng" algn="ctr">
+          <a:solidFill>
+            <a:schemeClr val="accent1">
+              <a:hueOff val="0"/>
+              <a:satOff val="0"/>
+              <a:lumOff val="0"/>
+              <a:alphaOff val="0"/>
+            </a:schemeClr>
+          </a:solidFill>
+          <a:prstDash val="solid"/>
+          <a:miter lim="800000"/>
+        </a:ln>
+        <a:effectLst/>
+      </dsp:spPr>
+      <dsp:style>
+        <a:lnRef idx="2">
+          <a:scrgbClr r="0" g="0" b="0"/>
+        </a:lnRef>
+        <a:fillRef idx="1">
+          <a:scrgbClr r="0" g="0" b="0"/>
+        </a:fillRef>
+        <a:effectRef idx="0">
+          <a:scrgbClr r="0" g="0" b="0"/>
+        </a:effectRef>
+        <a:fontRef idx="minor"/>
+      </dsp:style>
+    </dsp:sp>
+    <dsp:sp modelId="{B30E9D7C-1B64-4C61-9997-E0F0919FFEBE}">
+      <dsp:nvSpPr>
+        <dsp:cNvPr id="0" name=""/>
+        <dsp:cNvSpPr/>
+      </dsp:nvSpPr>
+      <dsp:spPr>
+        <a:xfrm>
+          <a:off x="349716" y="25555"/>
+          <a:ext cx="4896033" cy="1416960"/>
+        </a:xfrm>
+        <a:prstGeom prst="roundRect">
+          <a:avLst/>
+        </a:prstGeom>
+        <a:solidFill>
+          <a:schemeClr val="accent5">
+            <a:lumMod val="50000"/>
+          </a:schemeClr>
+        </a:solidFill>
+        <a:ln w="12700" cap="flat" cmpd="sng" algn="ctr">
+          <a:solidFill>
+            <a:schemeClr val="lt1">
+              <a:hueOff val="0"/>
+              <a:satOff val="0"/>
+              <a:lumOff val="0"/>
+              <a:alphaOff val="0"/>
+            </a:schemeClr>
+          </a:solidFill>
+          <a:prstDash val="solid"/>
+          <a:miter lim="800000"/>
+        </a:ln>
+        <a:effectLst/>
+      </dsp:spPr>
+      <dsp:style>
+        <a:lnRef idx="2">
+          <a:scrgbClr r="0" g="0" b="0"/>
+        </a:lnRef>
+        <a:fillRef idx="1">
+          <a:scrgbClr r="0" g="0" b="0"/>
+        </a:fillRef>
+        <a:effectRef idx="0">
+          <a:scrgbClr r="0" g="0" b="0"/>
+        </a:effectRef>
+        <a:fontRef idx="minor">
+          <a:schemeClr val="lt1"/>
+        </a:fontRef>
+      </dsp:style>
+      <dsp:txBody>
+        <a:bodyPr spcFirstLastPara="0" vert="horz" wrap="square" lIns="185058" tIns="0" rIns="185058" bIns="0" numCol="1" spcCol="1270" rtlCol="0" anchor="ctr" anchorCtr="0">
+          <a:noAutofit/>
+        </a:bodyPr>
+        <a:lstStyle/>
+        <a:p>
+          <a:pPr marL="0" lvl="0" indent="0" algn="l" defTabSz="2133600" rtl="0">
+            <a:lnSpc>
+              <a:spcPct val="90000"/>
+            </a:lnSpc>
+            <a:spcBef>
+              <a:spcPct val="0"/>
+            </a:spcBef>
+            <a:spcAft>
+              <a:spcPct val="35000"/>
+            </a:spcAft>
+            <a:buNone/>
+          </a:pPr>
+          <a:r>
+            <a:rPr lang="es-ES" sz="4800" kern="1200" noProof="0" dirty="0">
+              <a:latin typeface="Tahoma" panose="020B0604030504040204" pitchFamily="34" charset="0"/>
+              <a:ea typeface="Tahoma" panose="020B0604030504040204" pitchFamily="34" charset="0"/>
+              <a:cs typeface="Tahoma" panose="020B0604030504040204" pitchFamily="34" charset="0"/>
+            </a:rPr>
+            <a:t>Precisión: 87%</a:t>
+          </a:r>
+        </a:p>
+      </dsp:txBody>
+      <dsp:txXfrm>
+        <a:off x="418886" y="94725"/>
+        <a:ext cx="4757693" cy="1278620"/>
+      </dsp:txXfrm>
+    </dsp:sp>
+    <dsp:sp modelId="{87E2FD7C-0729-47B8-B1FB-A44E439BE764}">
+      <dsp:nvSpPr>
+        <dsp:cNvPr id="0" name=""/>
+        <dsp:cNvSpPr/>
+      </dsp:nvSpPr>
+      <dsp:spPr>
+        <a:xfrm>
+          <a:off x="0" y="2911315"/>
+          <a:ext cx="6994333" cy="1209600"/>
+        </a:xfrm>
+        <a:prstGeom prst="rect">
+          <a:avLst/>
+        </a:prstGeom>
+        <a:solidFill>
+          <a:schemeClr val="lt1">
+            <a:alpha val="90000"/>
+            <a:hueOff val="0"/>
+            <a:satOff val="0"/>
+            <a:lumOff val="0"/>
+            <a:alphaOff val="0"/>
+          </a:schemeClr>
+        </a:solidFill>
+        <a:ln w="12700" cap="flat" cmpd="sng" algn="ctr">
+          <a:solidFill>
+            <a:schemeClr val="accent2"/>
+          </a:solidFill>
+          <a:prstDash val="solid"/>
+          <a:miter lim="800000"/>
+        </a:ln>
+        <a:effectLst/>
+      </dsp:spPr>
+      <dsp:style>
+        <a:lnRef idx="2">
+          <a:scrgbClr r="0" g="0" b="0"/>
+        </a:lnRef>
+        <a:fillRef idx="1">
+          <a:scrgbClr r="0" g="0" b="0"/>
+        </a:fillRef>
+        <a:effectRef idx="0">
+          <a:scrgbClr r="0" g="0" b="0"/>
+        </a:effectRef>
+        <a:fontRef idx="minor"/>
+      </dsp:style>
+    </dsp:sp>
+    <dsp:sp modelId="{9F236B2A-6433-401D-953E-FC86D923A3BE}">
+      <dsp:nvSpPr>
+        <dsp:cNvPr id="0" name=""/>
+        <dsp:cNvSpPr/>
+      </dsp:nvSpPr>
+      <dsp:spPr>
+        <a:xfrm>
+          <a:off x="349716" y="2202835"/>
+          <a:ext cx="4896033" cy="1416960"/>
+        </a:xfrm>
+        <a:prstGeom prst="roundRect">
+          <a:avLst/>
+        </a:prstGeom>
+        <a:solidFill>
+          <a:schemeClr val="accent2"/>
+        </a:solidFill>
+        <a:ln w="12700" cap="flat" cmpd="sng" algn="ctr">
+          <a:solidFill>
+            <a:schemeClr val="lt1">
+              <a:hueOff val="0"/>
+              <a:satOff val="0"/>
+              <a:lumOff val="0"/>
+              <a:alphaOff val="0"/>
+            </a:schemeClr>
+          </a:solidFill>
+          <a:prstDash val="solid"/>
+          <a:miter lim="800000"/>
+        </a:ln>
+        <a:effectLst/>
+      </dsp:spPr>
+      <dsp:style>
+        <a:lnRef idx="2">
+          <a:scrgbClr r="0" g="0" b="0"/>
+        </a:lnRef>
+        <a:fillRef idx="1">
+          <a:scrgbClr r="0" g="0" b="0"/>
+        </a:fillRef>
+        <a:effectRef idx="0">
+          <a:scrgbClr r="0" g="0" b="0"/>
+        </a:effectRef>
+        <a:fontRef idx="minor">
+          <a:schemeClr val="lt1"/>
+        </a:fontRef>
+      </dsp:style>
+      <dsp:txBody>
+        <a:bodyPr spcFirstLastPara="0" vert="horz" wrap="square" lIns="185058" tIns="0" rIns="185058" bIns="0" numCol="1" spcCol="1270" rtlCol="0" anchor="ctr" anchorCtr="0">
+          <a:noAutofit/>
+        </a:bodyPr>
+        <a:lstStyle/>
+        <a:p>
+          <a:pPr marL="0" lvl="0" indent="0" algn="l" defTabSz="2133600" rtl="0">
+            <a:lnSpc>
+              <a:spcPct val="90000"/>
+            </a:lnSpc>
+            <a:spcBef>
+              <a:spcPct val="0"/>
+            </a:spcBef>
+            <a:spcAft>
+              <a:spcPct val="35000"/>
+            </a:spcAft>
+            <a:buNone/>
+          </a:pPr>
+          <a:r>
+            <a:rPr lang="es-ES" sz="4800" kern="1200" noProof="0" dirty="0">
+              <a:latin typeface="Tahoma" panose="020B0604030504040204" pitchFamily="34" charset="0"/>
+              <a:ea typeface="Tahoma" panose="020B0604030504040204" pitchFamily="34" charset="0"/>
+              <a:cs typeface="Tahoma" panose="020B0604030504040204" pitchFamily="34" charset="0"/>
+            </a:rPr>
+            <a:t>Pérdida: 40%</a:t>
+          </a:r>
+        </a:p>
+      </dsp:txBody>
+      <dsp:txXfrm>
+        <a:off x="418886" y="2272005"/>
+        <a:ext cx="4757693" cy="1278620"/>
+      </dsp:txXfrm>
+    </dsp:sp>
+  </dsp:spTree>
+</dsp:drawing>
+</file>
+
+<file path=ppt/diagrams/drawing2.xml><?xml version="1.0" encoding="utf-8"?>
 <dsp:drawing xmlns:dgm="http://schemas.openxmlformats.org/drawingml/2006/diagram" xmlns:dsp="http://schemas.microsoft.com/office/drawing/2008/diagram" xmlns:a="http://schemas.openxmlformats.org/drawingml/2006/main">
   <dsp:spTree>
     <dsp:nvGrpSpPr>
@@ -1592,7 +2823,1266 @@
 </dgm:layoutDef>
 </file>
 
+<file path=ppt/diagrams/layout2.xml><?xml version="1.0" encoding="utf-8"?>
+<dgm:layoutDef xmlns:dgm="http://schemas.openxmlformats.org/drawingml/2006/diagram" xmlns:a="http://schemas.openxmlformats.org/drawingml/2006/main" uniqueId="urn:microsoft.com/office/officeart/2005/8/layout/list1">
+  <dgm:title val=""/>
+  <dgm:desc val=""/>
+  <dgm:catLst>
+    <dgm:cat type="list" pri="4000"/>
+  </dgm:catLst>
+  <dgm:sampData>
+    <dgm:dataModel>
+      <dgm:ptLst>
+        <dgm:pt modelId="0" type="doc"/>
+        <dgm:pt modelId="1">
+          <dgm:prSet phldr="1"/>
+        </dgm:pt>
+        <dgm:pt modelId="2">
+          <dgm:prSet phldr="1"/>
+        </dgm:pt>
+        <dgm:pt modelId="3">
+          <dgm:prSet phldr="1"/>
+        </dgm:pt>
+      </dgm:ptLst>
+      <dgm:cxnLst>
+        <dgm:cxn modelId="4" srcId="0" destId="1" srcOrd="0" destOrd="0"/>
+        <dgm:cxn modelId="5" srcId="0" destId="2" srcOrd="1" destOrd="0"/>
+        <dgm:cxn modelId="6" srcId="0" destId="3" srcOrd="2" destOrd="0"/>
+      </dgm:cxnLst>
+      <dgm:bg/>
+      <dgm:whole/>
+    </dgm:dataModel>
+  </dgm:sampData>
+  <dgm:styleData>
+    <dgm:dataModel>
+      <dgm:ptLst>
+        <dgm:pt modelId="0" type="doc"/>
+        <dgm:pt modelId="1"/>
+        <dgm:pt modelId="2"/>
+      </dgm:ptLst>
+      <dgm:cxnLst>
+        <dgm:cxn modelId="4" srcId="0" destId="1" srcOrd="0" destOrd="0"/>
+        <dgm:cxn modelId="5" srcId="0" destId="2" srcOrd="1" destOrd="0"/>
+      </dgm:cxnLst>
+      <dgm:bg/>
+      <dgm:whole/>
+    </dgm:dataModel>
+  </dgm:styleData>
+  <dgm:clrData>
+    <dgm:dataModel>
+      <dgm:ptLst>
+        <dgm:pt modelId="0" type="doc"/>
+        <dgm:pt modelId="1"/>
+        <dgm:pt modelId="2"/>
+        <dgm:pt modelId="3"/>
+        <dgm:pt modelId="4"/>
+      </dgm:ptLst>
+      <dgm:cxnLst>
+        <dgm:cxn modelId="5" srcId="0" destId="1" srcOrd="0" destOrd="0"/>
+        <dgm:cxn modelId="6" srcId="0" destId="2" srcOrd="1" destOrd="0"/>
+        <dgm:cxn modelId="7" srcId="0" destId="3" srcOrd="2" destOrd="0"/>
+        <dgm:cxn modelId="8" srcId="0" destId="4" srcOrd="3" destOrd="0"/>
+      </dgm:cxnLst>
+      <dgm:bg/>
+      <dgm:whole/>
+    </dgm:dataModel>
+  </dgm:clrData>
+  <dgm:layoutNode name="linear">
+    <dgm:varLst>
+      <dgm:dir/>
+      <dgm:animLvl val="lvl"/>
+      <dgm:resizeHandles val="exact"/>
+    </dgm:varLst>
+    <dgm:choose name="Name0">
+      <dgm:if name="Name1" func="var" arg="dir" op="equ" val="norm">
+        <dgm:alg type="lin">
+          <dgm:param type="linDir" val="fromT"/>
+          <dgm:param type="vertAlign" val="mid"/>
+          <dgm:param type="horzAlign" val="l"/>
+          <dgm:param type="nodeHorzAlign" val="l"/>
+        </dgm:alg>
+      </dgm:if>
+      <dgm:else name="Name2">
+        <dgm:alg type="lin">
+          <dgm:param type="linDir" val="fromT"/>
+          <dgm:param type="vertAlign" val="mid"/>
+          <dgm:param type="horzAlign" val="r"/>
+          <dgm:param type="nodeHorzAlign" val="r"/>
+        </dgm:alg>
+      </dgm:else>
+    </dgm:choose>
+    <dgm:shape xmlns:r="http://schemas.openxmlformats.org/officeDocument/2006/relationships" r:blip="">
+      <dgm:adjLst/>
+    </dgm:shape>
+    <dgm:presOf/>
+    <dgm:constrLst>
+      <dgm:constr type="w" for="ch" forName="parentLin" refType="w"/>
+      <dgm:constr type="h" for="ch" forName="parentLin" val="INF"/>
+      <dgm:constr type="w" for="des" forName="parentLeftMargin" refType="w" fact="0.05"/>
+      <dgm:constr type="w" for="des" forName="parentText" refType="w" fact="0.7"/>
+      <dgm:constr type="h" for="des" forName="parentText" refType="primFontSz" refFor="des" refForName="parentText" fact="0.82"/>
+      <dgm:constr type="h" for="ch" forName="negativeSpace" refType="primFontSz" refFor="des" refForName="parentText" fact="-0.41"/>
+      <dgm:constr type="h" for="ch" forName="negativeSpace" refType="h" refFor="des" refForName="parentText" op="lte" fact="-0.82"/>
+      <dgm:constr type="h" for="ch" forName="negativeSpace" refType="h" refFor="des" refForName="parentText" op="gte" fact="-0.82"/>
+      <dgm:constr type="w" for="ch" forName="childText" refType="w"/>
+      <dgm:constr type="h" for="ch" forName="childText" refType="primFontSz" refFor="des" refForName="parentText" fact="0.7"/>
+      <dgm:constr type="primFontSz" for="des" forName="parentText" val="65"/>
+      <dgm:constr type="primFontSz" for="ch" forName="childText" refType="primFontSz" refFor="des" refForName="parentText"/>
+      <dgm:constr type="tMarg" for="ch" forName="childText" refType="primFontSz" refFor="des" refForName="parentText" fact="1.64"/>
+      <dgm:constr type="tMarg" for="ch" forName="childText" refType="h" refFor="des" refForName="parentText" op="lte" fact="3.28"/>
+      <dgm:constr type="tMarg" for="ch" forName="childText" refType="h" refFor="des" refForName="parentText" op="gte" fact="3.28"/>
+      <dgm:constr type="lMarg" for="ch" forName="childText" refType="w" fact="0.22"/>
+      <dgm:constr type="rMarg" for="ch" forName="childText" refType="lMarg" refFor="ch" refForName="childText"/>
+      <dgm:constr type="lMarg" for="des" forName="parentText" refType="w" fact="0.075"/>
+      <dgm:constr type="rMarg" for="des" forName="parentText" refType="lMarg" refFor="des" refForName="parentText"/>
+      <dgm:constr type="h" for="ch" forName="spaceBetweenRectangles" refType="primFontSz" refFor="des" refForName="parentText" fact="0.15"/>
+    </dgm:constrLst>
+    <dgm:ruleLst>
+      <dgm:rule type="primFontSz" for="des" forName="parentText" val="5" fact="NaN" max="NaN"/>
+    </dgm:ruleLst>
+    <dgm:forEach name="Name3" axis="ch" ptType="node">
+      <dgm:layoutNode name="parentLin">
+        <dgm:choose name="Name4">
+          <dgm:if name="Name5" func="var" arg="dir" op="equ" val="norm">
+            <dgm:alg type="lin">
+              <dgm:param type="linDir" val="fromL"/>
+              <dgm:param type="horzAlign" val="l"/>
+              <dgm:param type="nodeHorzAlign" val="l"/>
+            </dgm:alg>
+          </dgm:if>
+          <dgm:else name="Name6">
+            <dgm:alg type="lin">
+              <dgm:param type="linDir" val="fromR"/>
+              <dgm:param type="horzAlign" val="r"/>
+              <dgm:param type="nodeHorzAlign" val="r"/>
+            </dgm:alg>
+          </dgm:else>
+        </dgm:choose>
+        <dgm:shape xmlns:r="http://schemas.openxmlformats.org/officeDocument/2006/relationships" r:blip="">
+          <dgm:adjLst/>
+        </dgm:shape>
+        <dgm:presOf/>
+        <dgm:constrLst/>
+        <dgm:ruleLst/>
+        <dgm:layoutNode name="parentLeftMargin">
+          <dgm:alg type="sp"/>
+          <dgm:shape xmlns:r="http://schemas.openxmlformats.org/officeDocument/2006/relationships" type="rect" r:blip="" hideGeom="1">
+            <dgm:adjLst/>
+          </dgm:shape>
+          <dgm:presOf axis="self"/>
+          <dgm:constrLst>
+            <dgm:constr type="h"/>
+          </dgm:constrLst>
+          <dgm:ruleLst/>
+        </dgm:layoutNode>
+        <dgm:layoutNode name="parentText" styleLbl="node1">
+          <dgm:varLst>
+            <dgm:chMax val="0"/>
+            <dgm:bulletEnabled val="1"/>
+          </dgm:varLst>
+          <dgm:choose name="Name7">
+            <dgm:if name="Name8" func="var" arg="dir" op="equ" val="norm">
+              <dgm:alg type="tx">
+                <dgm:param type="parTxLTRAlign" val="l"/>
+                <dgm:param type="parTxRTLAlign" val="l"/>
+              </dgm:alg>
+            </dgm:if>
+            <dgm:else name="Name9">
+              <dgm:alg type="tx">
+                <dgm:param type="parTxLTRAlign" val="r"/>
+                <dgm:param type="parTxRTLAlign" val="r"/>
+              </dgm:alg>
+            </dgm:else>
+          </dgm:choose>
+          <dgm:shape xmlns:r="http://schemas.openxmlformats.org/officeDocument/2006/relationships" type="roundRect" r:blip="">
+            <dgm:adjLst/>
+          </dgm:shape>
+          <dgm:presOf axis="self" ptType="node"/>
+          <dgm:constrLst>
+            <dgm:constr type="tMarg"/>
+            <dgm:constr type="bMarg"/>
+          </dgm:constrLst>
+          <dgm:ruleLst/>
+        </dgm:layoutNode>
+      </dgm:layoutNode>
+      <dgm:layoutNode name="negativeSpace">
+        <dgm:alg type="sp"/>
+        <dgm:shape xmlns:r="http://schemas.openxmlformats.org/officeDocument/2006/relationships" r:blip="">
+          <dgm:adjLst/>
+        </dgm:shape>
+        <dgm:presOf/>
+        <dgm:constrLst/>
+        <dgm:ruleLst/>
+      </dgm:layoutNode>
+      <dgm:layoutNode name="childText" styleLbl="conFgAcc1">
+        <dgm:varLst>
+          <dgm:bulletEnabled val="1"/>
+        </dgm:varLst>
+        <dgm:alg type="tx">
+          <dgm:param type="stBulletLvl" val="1"/>
+        </dgm:alg>
+        <dgm:shape xmlns:r="http://schemas.openxmlformats.org/officeDocument/2006/relationships" type="rect" r:blip="" zOrderOff="-2">
+          <dgm:adjLst/>
+        </dgm:shape>
+        <dgm:presOf axis="des" ptType="node"/>
+        <dgm:constrLst>
+          <dgm:constr type="secFontSz" refType="primFontSz"/>
+        </dgm:constrLst>
+        <dgm:ruleLst>
+          <dgm:rule type="h" val="INF" fact="NaN" max="NaN"/>
+        </dgm:ruleLst>
+      </dgm:layoutNode>
+      <dgm:forEach name="Name10" axis="followSib" ptType="sibTrans" cnt="1">
+        <dgm:layoutNode name="spaceBetweenRectangles">
+          <dgm:alg type="sp"/>
+          <dgm:shape xmlns:r="http://schemas.openxmlformats.org/officeDocument/2006/relationships" r:blip="">
+            <dgm:adjLst/>
+          </dgm:shape>
+          <dgm:presOf/>
+          <dgm:constrLst/>
+          <dgm:ruleLst/>
+        </dgm:layoutNode>
+      </dgm:forEach>
+    </dgm:forEach>
+  </dgm:layoutNode>
+</dgm:layoutDef>
+</file>
+
 <file path=ppt/diagrams/quickStyle1.xml><?xml version="1.0" encoding="utf-8"?>
+<dgm:styleDef xmlns:dgm="http://schemas.openxmlformats.org/drawingml/2006/diagram" xmlns:a="http://schemas.openxmlformats.org/drawingml/2006/main" uniqueId="urn:microsoft.com/office/officeart/2005/8/quickstyle/simple1">
+  <dgm:title val=""/>
+  <dgm:desc val=""/>
+  <dgm:catLst>
+    <dgm:cat type="simple" pri="10100"/>
+  </dgm:catLst>
+  <dgm:scene3d>
+    <a:camera prst="orthographicFront"/>
+    <a:lightRig rig="threePt" dir="t"/>
+  </dgm:scene3d>
+  <dgm:styleLbl name="node0">
+    <dgm:scene3d>
+      <a:camera prst="orthographicFront"/>
+      <a:lightRig rig="threePt" dir="t"/>
+    </dgm:scene3d>
+    <dgm:sp3d/>
+    <dgm:txPr/>
+    <dgm:style>
+      <a:lnRef idx="2">
+        <a:scrgbClr r="0" g="0" b="0"/>
+      </a:lnRef>
+      <a:fillRef idx="1">
+        <a:scrgbClr r="0" g="0" b="0"/>
+      </a:fillRef>
+      <a:effectRef idx="0">
+        <a:scrgbClr r="0" g="0" b="0"/>
+      </a:effectRef>
+      <a:fontRef idx="minor">
+        <a:schemeClr val="lt1"/>
+      </a:fontRef>
+    </dgm:style>
+  </dgm:styleLbl>
+  <dgm:styleLbl name="lnNode1">
+    <dgm:scene3d>
+      <a:camera prst="orthographicFront"/>
+      <a:lightRig rig="threePt" dir="t"/>
+    </dgm:scene3d>
+    <dgm:sp3d/>
+    <dgm:txPr/>
+    <dgm:style>
+      <a:lnRef idx="2">
+        <a:scrgbClr r="0" g="0" b="0"/>
+      </a:lnRef>
+      <a:fillRef idx="1">
+        <a:scrgbClr r="0" g="0" b="0"/>
+      </a:fillRef>
+      <a:effectRef idx="0">
+        <a:scrgbClr r="0" g="0" b="0"/>
+      </a:effectRef>
+      <a:fontRef idx="minor">
+        <a:schemeClr val="lt1"/>
+      </a:fontRef>
+    </dgm:style>
+  </dgm:styleLbl>
+  <dgm:styleLbl name="vennNode1">
+    <dgm:scene3d>
+      <a:camera prst="orthographicFront"/>
+      <a:lightRig rig="threePt" dir="t"/>
+    </dgm:scene3d>
+    <dgm:sp3d/>
+    <dgm:txPr/>
+    <dgm:style>
+      <a:lnRef idx="2">
+        <a:scrgbClr r="0" g="0" b="0"/>
+      </a:lnRef>
+      <a:fillRef idx="1">
+        <a:scrgbClr r="0" g="0" b="0"/>
+      </a:fillRef>
+      <a:effectRef idx="0">
+        <a:scrgbClr r="0" g="0" b="0"/>
+      </a:effectRef>
+      <a:fontRef idx="minor">
+        <a:schemeClr val="tx1"/>
+      </a:fontRef>
+    </dgm:style>
+  </dgm:styleLbl>
+  <dgm:styleLbl name="alignNode1">
+    <dgm:scene3d>
+      <a:camera prst="orthographicFront"/>
+      <a:lightRig rig="threePt" dir="t"/>
+    </dgm:scene3d>
+    <dgm:sp3d/>
+    <dgm:txPr/>
+    <dgm:style>
+      <a:lnRef idx="2">
+        <a:scrgbClr r="0" g="0" b="0"/>
+      </a:lnRef>
+      <a:fillRef idx="1">
+        <a:scrgbClr r="0" g="0" b="0"/>
+      </a:fillRef>
+      <a:effectRef idx="0">
+        <a:scrgbClr r="0" g="0" b="0"/>
+      </a:effectRef>
+      <a:fontRef idx="minor">
+        <a:schemeClr val="lt1"/>
+      </a:fontRef>
+    </dgm:style>
+  </dgm:styleLbl>
+  <dgm:styleLbl name="node1">
+    <dgm:scene3d>
+      <a:camera prst="orthographicFront"/>
+      <a:lightRig rig="threePt" dir="t"/>
+    </dgm:scene3d>
+    <dgm:sp3d/>
+    <dgm:txPr/>
+    <dgm:style>
+      <a:lnRef idx="2">
+        <a:scrgbClr r="0" g="0" b="0"/>
+      </a:lnRef>
+      <a:fillRef idx="1">
+        <a:scrgbClr r="0" g="0" b="0"/>
+      </a:fillRef>
+      <a:effectRef idx="0">
+        <a:scrgbClr r="0" g="0" b="0"/>
+      </a:effectRef>
+      <a:fontRef idx="minor">
+        <a:schemeClr val="lt1"/>
+      </a:fontRef>
+    </dgm:style>
+  </dgm:styleLbl>
+  <dgm:styleLbl name="node2">
+    <dgm:scene3d>
+      <a:camera prst="orthographicFront"/>
+      <a:lightRig rig="threePt" dir="t"/>
+    </dgm:scene3d>
+    <dgm:sp3d/>
+    <dgm:txPr/>
+    <dgm:style>
+      <a:lnRef idx="2">
+        <a:scrgbClr r="0" g="0" b="0"/>
+      </a:lnRef>
+      <a:fillRef idx="1">
+        <a:scrgbClr r="0" g="0" b="0"/>
+      </a:fillRef>
+      <a:effectRef idx="0">
+        <a:scrgbClr r="0" g="0" b="0"/>
+      </a:effectRef>
+      <a:fontRef idx="minor">
+        <a:schemeClr val="lt1"/>
+      </a:fontRef>
+    </dgm:style>
+  </dgm:styleLbl>
+  <dgm:styleLbl name="node3">
+    <dgm:scene3d>
+      <a:camera prst="orthographicFront"/>
+      <a:lightRig rig="threePt" dir="t"/>
+    </dgm:scene3d>
+    <dgm:sp3d/>
+    <dgm:txPr/>
+    <dgm:style>
+      <a:lnRef idx="2">
+        <a:scrgbClr r="0" g="0" b="0"/>
+      </a:lnRef>
+      <a:fillRef idx="1">
+        <a:scrgbClr r="0" g="0" b="0"/>
+      </a:fillRef>
+      <a:effectRef idx="0">
+        <a:scrgbClr r="0" g="0" b="0"/>
+      </a:effectRef>
+      <a:fontRef idx="minor">
+        <a:schemeClr val="lt1"/>
+      </a:fontRef>
+    </dgm:style>
+  </dgm:styleLbl>
+  <dgm:styleLbl name="node4">
+    <dgm:scene3d>
+      <a:camera prst="orthographicFront"/>
+      <a:lightRig rig="threePt" dir="t"/>
+    </dgm:scene3d>
+    <dgm:sp3d/>
+    <dgm:txPr/>
+    <dgm:style>
+      <a:lnRef idx="2">
+        <a:scrgbClr r="0" g="0" b="0"/>
+      </a:lnRef>
+      <a:fillRef idx="1">
+        <a:scrgbClr r="0" g="0" b="0"/>
+      </a:fillRef>
+      <a:effectRef idx="0">
+        <a:scrgbClr r="0" g="0" b="0"/>
+      </a:effectRef>
+      <a:fontRef idx="minor">
+        <a:schemeClr val="lt1"/>
+      </a:fontRef>
+    </dgm:style>
+  </dgm:styleLbl>
+  <dgm:styleLbl name="fgImgPlace1">
+    <dgm:scene3d>
+      <a:camera prst="orthographicFront"/>
+      <a:lightRig rig="threePt" dir="t"/>
+    </dgm:scene3d>
+    <dgm:sp3d/>
+    <dgm:txPr/>
+    <dgm:style>
+      <a:lnRef idx="2">
+        <a:scrgbClr r="0" g="0" b="0"/>
+      </a:lnRef>
+      <a:fillRef idx="1">
+        <a:scrgbClr r="0" g="0" b="0"/>
+      </a:fillRef>
+      <a:effectRef idx="0">
+        <a:scrgbClr r="0" g="0" b="0"/>
+      </a:effectRef>
+      <a:fontRef idx="minor"/>
+    </dgm:style>
+  </dgm:styleLbl>
+  <dgm:styleLbl name="alignImgPlace1">
+    <dgm:scene3d>
+      <a:camera prst="orthographicFront"/>
+      <a:lightRig rig="threePt" dir="t"/>
+    </dgm:scene3d>
+    <dgm:sp3d/>
+    <dgm:txPr/>
+    <dgm:style>
+      <a:lnRef idx="2">
+        <a:scrgbClr r="0" g="0" b="0"/>
+      </a:lnRef>
+      <a:fillRef idx="1">
+        <a:scrgbClr r="0" g="0" b="0"/>
+      </a:fillRef>
+      <a:effectRef idx="0">
+        <a:scrgbClr r="0" g="0" b="0"/>
+      </a:effectRef>
+      <a:fontRef idx="minor"/>
+    </dgm:style>
+  </dgm:styleLbl>
+  <dgm:styleLbl name="bgImgPlace1">
+    <dgm:scene3d>
+      <a:camera prst="orthographicFront"/>
+      <a:lightRig rig="threePt" dir="t"/>
+    </dgm:scene3d>
+    <dgm:sp3d/>
+    <dgm:txPr/>
+    <dgm:style>
+      <a:lnRef idx="2">
+        <a:scrgbClr r="0" g="0" b="0"/>
+      </a:lnRef>
+      <a:fillRef idx="1">
+        <a:scrgbClr r="0" g="0" b="0"/>
+      </a:fillRef>
+      <a:effectRef idx="0">
+        <a:scrgbClr r="0" g="0" b="0"/>
+      </a:effectRef>
+      <a:fontRef idx="minor"/>
+    </dgm:style>
+  </dgm:styleLbl>
+  <dgm:styleLbl name="sibTrans2D1">
+    <dgm:scene3d>
+      <a:camera prst="orthographicFront"/>
+      <a:lightRig rig="threePt" dir="t"/>
+    </dgm:scene3d>
+    <dgm:sp3d/>
+    <dgm:txPr/>
+    <dgm:style>
+      <a:lnRef idx="0">
+        <a:scrgbClr r="0" g="0" b="0"/>
+      </a:lnRef>
+      <a:fillRef idx="1">
+        <a:scrgbClr r="0" g="0" b="0"/>
+      </a:fillRef>
+      <a:effectRef idx="0">
+        <a:scrgbClr r="0" g="0" b="0"/>
+      </a:effectRef>
+      <a:fontRef idx="minor">
+        <a:schemeClr val="lt1"/>
+      </a:fontRef>
+    </dgm:style>
+  </dgm:styleLbl>
+  <dgm:styleLbl name="fgSibTrans2D1">
+    <dgm:scene3d>
+      <a:camera prst="orthographicFront"/>
+      <a:lightRig rig="threePt" dir="t"/>
+    </dgm:scene3d>
+    <dgm:sp3d/>
+    <dgm:txPr/>
+    <dgm:style>
+      <a:lnRef idx="0">
+        <a:scrgbClr r="0" g="0" b="0"/>
+      </a:lnRef>
+      <a:fillRef idx="1">
+        <a:scrgbClr r="0" g="0" b="0"/>
+      </a:fillRef>
+      <a:effectRef idx="0">
+        <a:scrgbClr r="0" g="0" b="0"/>
+      </a:effectRef>
+      <a:fontRef idx="minor">
+        <a:schemeClr val="lt1"/>
+      </a:fontRef>
+    </dgm:style>
+  </dgm:styleLbl>
+  <dgm:styleLbl name="bgSibTrans2D1">
+    <dgm:scene3d>
+      <a:camera prst="orthographicFront"/>
+      <a:lightRig rig="threePt" dir="t"/>
+    </dgm:scene3d>
+    <dgm:sp3d/>
+    <dgm:txPr/>
+    <dgm:style>
+      <a:lnRef idx="0">
+        <a:scrgbClr r="0" g="0" b="0"/>
+      </a:lnRef>
+      <a:fillRef idx="1">
+        <a:scrgbClr r="0" g="0" b="0"/>
+      </a:fillRef>
+      <a:effectRef idx="0">
+        <a:scrgbClr r="0" g="0" b="0"/>
+      </a:effectRef>
+      <a:fontRef idx="minor">
+        <a:schemeClr val="lt1"/>
+      </a:fontRef>
+    </dgm:style>
+  </dgm:styleLbl>
+  <dgm:styleLbl name="sibTrans1D1">
+    <dgm:scene3d>
+      <a:camera prst="orthographicFront"/>
+      <a:lightRig rig="threePt" dir="t"/>
+    </dgm:scene3d>
+    <dgm:sp3d/>
+    <dgm:txPr/>
+    <dgm:style>
+      <a:lnRef idx="1">
+        <a:scrgbClr r="0" g="0" b="0"/>
+      </a:lnRef>
+      <a:fillRef idx="0">
+        <a:scrgbClr r="0" g="0" b="0"/>
+      </a:fillRef>
+      <a:effectRef idx="0">
+        <a:scrgbClr r="0" g="0" b="0"/>
+      </a:effectRef>
+      <a:fontRef idx="minor"/>
+    </dgm:style>
+  </dgm:styleLbl>
+  <dgm:styleLbl name="callout">
+    <dgm:scene3d>
+      <a:camera prst="orthographicFront"/>
+      <a:lightRig rig="threePt" dir="t"/>
+    </dgm:scene3d>
+    <dgm:sp3d/>
+    <dgm:txPr/>
+    <dgm:style>
+      <a:lnRef idx="2">
+        <a:scrgbClr r="0" g="0" b="0"/>
+      </a:lnRef>
+      <a:fillRef idx="1">
+        <a:scrgbClr r="0" g="0" b="0"/>
+      </a:fillRef>
+      <a:effectRef idx="0">
+        <a:scrgbClr r="0" g="0" b="0"/>
+      </a:effectRef>
+      <a:fontRef idx="minor"/>
+    </dgm:style>
+  </dgm:styleLbl>
+  <dgm:styleLbl name="asst0">
+    <dgm:scene3d>
+      <a:camera prst="orthographicFront"/>
+      <a:lightRig rig="threePt" dir="t"/>
+    </dgm:scene3d>
+    <dgm:sp3d/>
+    <dgm:txPr/>
+    <dgm:style>
+      <a:lnRef idx="2">
+        <a:scrgbClr r="0" g="0" b="0"/>
+      </a:lnRef>
+      <a:fillRef idx="1">
+        <a:scrgbClr r="0" g="0" b="0"/>
+      </a:fillRef>
+      <a:effectRef idx="0">
+        <a:scrgbClr r="0" g="0" b="0"/>
+      </a:effectRef>
+      <a:fontRef idx="minor">
+        <a:schemeClr val="lt1"/>
+      </a:fontRef>
+    </dgm:style>
+  </dgm:styleLbl>
+  <dgm:styleLbl name="asst1">
+    <dgm:scene3d>
+      <a:camera prst="orthographicFront"/>
+      <a:lightRig rig="threePt" dir="t"/>
+    </dgm:scene3d>
+    <dgm:sp3d/>
+    <dgm:txPr/>
+    <dgm:style>
+      <a:lnRef idx="2">
+        <a:scrgbClr r="0" g="0" b="0"/>
+      </a:lnRef>
+      <a:fillRef idx="1">
+        <a:scrgbClr r="0" g="0" b="0"/>
+      </a:fillRef>
+      <a:effectRef idx="0">
+        <a:scrgbClr r="0" g="0" b="0"/>
+      </a:effectRef>
+      <a:fontRef idx="minor">
+        <a:schemeClr val="lt1"/>
+      </a:fontRef>
+    </dgm:style>
+  </dgm:styleLbl>
+  <dgm:styleLbl name="asst2">
+    <dgm:scene3d>
+      <a:camera prst="orthographicFront"/>
+      <a:lightRig rig="threePt" dir="t"/>
+    </dgm:scene3d>
+    <dgm:sp3d/>
+    <dgm:txPr/>
+    <dgm:style>
+      <a:lnRef idx="2">
+        <a:scrgbClr r="0" g="0" b="0"/>
+      </a:lnRef>
+      <a:fillRef idx="1">
+        <a:scrgbClr r="0" g="0" b="0"/>
+      </a:fillRef>
+      <a:effectRef idx="0">
+        <a:scrgbClr r="0" g="0" b="0"/>
+      </a:effectRef>
+      <a:fontRef idx="minor">
+        <a:schemeClr val="lt1"/>
+      </a:fontRef>
+    </dgm:style>
+  </dgm:styleLbl>
+  <dgm:styleLbl name="asst3">
+    <dgm:scene3d>
+      <a:camera prst="orthographicFront"/>
+      <a:lightRig rig="threePt" dir="t"/>
+    </dgm:scene3d>
+    <dgm:sp3d/>
+    <dgm:txPr/>
+    <dgm:style>
+      <a:lnRef idx="2">
+        <a:scrgbClr r="0" g="0" b="0"/>
+      </a:lnRef>
+      <a:fillRef idx="1">
+        <a:scrgbClr r="0" g="0" b="0"/>
+      </a:fillRef>
+      <a:effectRef idx="0">
+        <a:scrgbClr r="0" g="0" b="0"/>
+      </a:effectRef>
+      <a:fontRef idx="minor">
+        <a:schemeClr val="lt1"/>
+      </a:fontRef>
+    </dgm:style>
+  </dgm:styleLbl>
+  <dgm:styleLbl name="asst4">
+    <dgm:scene3d>
+      <a:camera prst="orthographicFront"/>
+      <a:lightRig rig="threePt" dir="t"/>
+    </dgm:scene3d>
+    <dgm:sp3d/>
+    <dgm:txPr/>
+    <dgm:style>
+      <a:lnRef idx="2">
+        <a:scrgbClr r="0" g="0" b="0"/>
+      </a:lnRef>
+      <a:fillRef idx="1">
+        <a:scrgbClr r="0" g="0" b="0"/>
+      </a:fillRef>
+      <a:effectRef idx="0">
+        <a:scrgbClr r="0" g="0" b="0"/>
+      </a:effectRef>
+      <a:fontRef idx="minor">
+        <a:schemeClr val="lt1"/>
+      </a:fontRef>
+    </dgm:style>
+  </dgm:styleLbl>
+  <dgm:styleLbl name="parChTrans2D1">
+    <dgm:scene3d>
+      <a:camera prst="orthographicFront"/>
+      <a:lightRig rig="threePt" dir="t"/>
+    </dgm:scene3d>
+    <dgm:sp3d/>
+    <dgm:txPr/>
+    <dgm:style>
+      <a:lnRef idx="2">
+        <a:scrgbClr r="0" g="0" b="0"/>
+      </a:lnRef>
+      <a:fillRef idx="1">
+        <a:scrgbClr r="0" g="0" b="0"/>
+      </a:fillRef>
+      <a:effectRef idx="0">
+        <a:scrgbClr r="0" g="0" b="0"/>
+      </a:effectRef>
+      <a:fontRef idx="minor">
+        <a:schemeClr val="lt1"/>
+      </a:fontRef>
+    </dgm:style>
+  </dgm:styleLbl>
+  <dgm:styleLbl name="parChTrans2D2">
+    <dgm:scene3d>
+      <a:camera prst="orthographicFront"/>
+      <a:lightRig rig="threePt" dir="t"/>
+    </dgm:scene3d>
+    <dgm:sp3d/>
+    <dgm:txPr/>
+    <dgm:style>
+      <a:lnRef idx="2">
+        <a:scrgbClr r="0" g="0" b="0"/>
+      </a:lnRef>
+      <a:fillRef idx="1">
+        <a:scrgbClr r="0" g="0" b="0"/>
+      </a:fillRef>
+      <a:effectRef idx="0">
+        <a:scrgbClr r="0" g="0" b="0"/>
+      </a:effectRef>
+      <a:fontRef idx="minor">
+        <a:schemeClr val="lt1"/>
+      </a:fontRef>
+    </dgm:style>
+  </dgm:styleLbl>
+  <dgm:styleLbl name="parChTrans2D3">
+    <dgm:scene3d>
+      <a:camera prst="orthographicFront"/>
+      <a:lightRig rig="threePt" dir="t"/>
+    </dgm:scene3d>
+    <dgm:sp3d/>
+    <dgm:txPr/>
+    <dgm:style>
+      <a:lnRef idx="2">
+        <a:scrgbClr r="0" g="0" b="0"/>
+      </a:lnRef>
+      <a:fillRef idx="1">
+        <a:scrgbClr r="0" g="0" b="0"/>
+      </a:fillRef>
+      <a:effectRef idx="0">
+        <a:scrgbClr r="0" g="0" b="0"/>
+      </a:effectRef>
+      <a:fontRef idx="minor">
+        <a:schemeClr val="lt1"/>
+      </a:fontRef>
+    </dgm:style>
+  </dgm:styleLbl>
+  <dgm:styleLbl name="parChTrans2D4">
+    <dgm:scene3d>
+      <a:camera prst="orthographicFront"/>
+      <a:lightRig rig="threePt" dir="t"/>
+    </dgm:scene3d>
+    <dgm:sp3d/>
+    <dgm:txPr/>
+    <dgm:style>
+      <a:lnRef idx="2">
+        <a:scrgbClr r="0" g="0" b="0"/>
+      </a:lnRef>
+      <a:fillRef idx="1">
+        <a:scrgbClr r="0" g="0" b="0"/>
+      </a:fillRef>
+      <a:effectRef idx="0">
+        <a:scrgbClr r="0" g="0" b="0"/>
+      </a:effectRef>
+      <a:fontRef idx="minor">
+        <a:schemeClr val="lt1"/>
+      </a:fontRef>
+    </dgm:style>
+  </dgm:styleLbl>
+  <dgm:styleLbl name="parChTrans1D1">
+    <dgm:scene3d>
+      <a:camera prst="orthographicFront"/>
+      <a:lightRig rig="threePt" dir="t"/>
+    </dgm:scene3d>
+    <dgm:sp3d/>
+    <dgm:txPr/>
+    <dgm:style>
+      <a:lnRef idx="2">
+        <a:scrgbClr r="0" g="0" b="0"/>
+      </a:lnRef>
+      <a:fillRef idx="0">
+        <a:scrgbClr r="0" g="0" b="0"/>
+      </a:fillRef>
+      <a:effectRef idx="0">
+        <a:scrgbClr r="0" g="0" b="0"/>
+      </a:effectRef>
+      <a:fontRef idx="minor"/>
+    </dgm:style>
+  </dgm:styleLbl>
+  <dgm:styleLbl name="parChTrans1D2">
+    <dgm:scene3d>
+      <a:camera prst="orthographicFront"/>
+      <a:lightRig rig="threePt" dir="t"/>
+    </dgm:scene3d>
+    <dgm:sp3d/>
+    <dgm:txPr/>
+    <dgm:style>
+      <a:lnRef idx="2">
+        <a:scrgbClr r="0" g="0" b="0"/>
+      </a:lnRef>
+      <a:fillRef idx="0">
+        <a:scrgbClr r="0" g="0" b="0"/>
+      </a:fillRef>
+      <a:effectRef idx="0">
+        <a:scrgbClr r="0" g="0" b="0"/>
+      </a:effectRef>
+      <a:fontRef idx="minor"/>
+    </dgm:style>
+  </dgm:styleLbl>
+  <dgm:styleLbl name="parChTrans1D3">
+    <dgm:scene3d>
+      <a:camera prst="orthographicFront"/>
+      <a:lightRig rig="threePt" dir="t"/>
+    </dgm:scene3d>
+    <dgm:sp3d/>
+    <dgm:txPr/>
+    <dgm:style>
+      <a:lnRef idx="2">
+        <a:scrgbClr r="0" g="0" b="0"/>
+      </a:lnRef>
+      <a:fillRef idx="0">
+        <a:scrgbClr r="0" g="0" b="0"/>
+      </a:fillRef>
+      <a:effectRef idx="0">
+        <a:scrgbClr r="0" g="0" b="0"/>
+      </a:effectRef>
+      <a:fontRef idx="minor"/>
+    </dgm:style>
+  </dgm:styleLbl>
+  <dgm:styleLbl name="parChTrans1D4">
+    <dgm:scene3d>
+      <a:camera prst="orthographicFront"/>
+      <a:lightRig rig="threePt" dir="t"/>
+    </dgm:scene3d>
+    <dgm:sp3d/>
+    <dgm:txPr/>
+    <dgm:style>
+      <a:lnRef idx="2">
+        <a:scrgbClr r="0" g="0" b="0"/>
+      </a:lnRef>
+      <a:fillRef idx="0">
+        <a:scrgbClr r="0" g="0" b="0"/>
+      </a:fillRef>
+      <a:effectRef idx="0">
+        <a:scrgbClr r="0" g="0" b="0"/>
+      </a:effectRef>
+      <a:fontRef idx="minor"/>
+    </dgm:style>
+  </dgm:styleLbl>
+  <dgm:styleLbl name="fgAcc1">
+    <dgm:scene3d>
+      <a:camera prst="orthographicFront"/>
+      <a:lightRig rig="threePt" dir="t"/>
+    </dgm:scene3d>
+    <dgm:sp3d/>
+    <dgm:txPr/>
+    <dgm:style>
+      <a:lnRef idx="2">
+        <a:scrgbClr r="0" g="0" b="0"/>
+      </a:lnRef>
+      <a:fillRef idx="1">
+        <a:scrgbClr r="0" g="0" b="0"/>
+      </a:fillRef>
+      <a:effectRef idx="0">
+        <a:scrgbClr r="0" g="0" b="0"/>
+      </a:effectRef>
+      <a:fontRef idx="minor"/>
+    </dgm:style>
+  </dgm:styleLbl>
+  <dgm:styleLbl name="conFgAcc1">
+    <dgm:scene3d>
+      <a:camera prst="orthographicFront"/>
+      <a:lightRig rig="threePt" dir="t"/>
+    </dgm:scene3d>
+    <dgm:sp3d/>
+    <dgm:txPr/>
+    <dgm:style>
+      <a:lnRef idx="2">
+        <a:scrgbClr r="0" g="0" b="0"/>
+      </a:lnRef>
+      <a:fillRef idx="1">
+        <a:scrgbClr r="0" g="0" b="0"/>
+      </a:fillRef>
+      <a:effectRef idx="0">
+        <a:scrgbClr r="0" g="0" b="0"/>
+      </a:effectRef>
+      <a:fontRef idx="minor"/>
+    </dgm:style>
+  </dgm:styleLbl>
+  <dgm:styleLbl name="alignAcc1">
+    <dgm:scene3d>
+      <a:camera prst="orthographicFront"/>
+      <a:lightRig rig="threePt" dir="t"/>
+    </dgm:scene3d>
+    <dgm:sp3d/>
+    <dgm:txPr/>
+    <dgm:style>
+      <a:lnRef idx="2">
+        <a:scrgbClr r="0" g="0" b="0"/>
+      </a:lnRef>
+      <a:fillRef idx="1">
+        <a:scrgbClr r="0" g="0" b="0"/>
+      </a:fillRef>
+      <a:effectRef idx="0">
+        <a:scrgbClr r="0" g="0" b="0"/>
+      </a:effectRef>
+      <a:fontRef idx="minor"/>
+    </dgm:style>
+  </dgm:styleLbl>
+  <dgm:styleLbl name="trAlignAcc1">
+    <dgm:scene3d>
+      <a:camera prst="orthographicFront"/>
+      <a:lightRig rig="threePt" dir="t"/>
+    </dgm:scene3d>
+    <dgm:sp3d/>
+    <dgm:txPr/>
+    <dgm:style>
+      <a:lnRef idx="1">
+        <a:scrgbClr r="0" g="0" b="0"/>
+      </a:lnRef>
+      <a:fillRef idx="1">
+        <a:scrgbClr r="0" g="0" b="0"/>
+      </a:fillRef>
+      <a:effectRef idx="0">
+        <a:scrgbClr r="0" g="0" b="0"/>
+      </a:effectRef>
+      <a:fontRef idx="minor"/>
+    </dgm:style>
+  </dgm:styleLbl>
+  <dgm:styleLbl name="bgAcc1">
+    <dgm:scene3d>
+      <a:camera prst="orthographicFront"/>
+      <a:lightRig rig="threePt" dir="t"/>
+    </dgm:scene3d>
+    <dgm:sp3d/>
+    <dgm:txPr/>
+    <dgm:style>
+      <a:lnRef idx="2">
+        <a:scrgbClr r="0" g="0" b="0"/>
+      </a:lnRef>
+      <a:fillRef idx="1">
+        <a:scrgbClr r="0" g="0" b="0"/>
+      </a:fillRef>
+      <a:effectRef idx="0">
+        <a:scrgbClr r="0" g="0" b="0"/>
+      </a:effectRef>
+      <a:fontRef idx="minor"/>
+    </dgm:style>
+  </dgm:styleLbl>
+  <dgm:styleLbl name="solidFgAcc1">
+    <dgm:scene3d>
+      <a:camera prst="orthographicFront"/>
+      <a:lightRig rig="threePt" dir="t"/>
+    </dgm:scene3d>
+    <dgm:sp3d/>
+    <dgm:txPr/>
+    <dgm:style>
+      <a:lnRef idx="2">
+        <a:scrgbClr r="0" g="0" b="0"/>
+      </a:lnRef>
+      <a:fillRef idx="1">
+        <a:scrgbClr r="0" g="0" b="0"/>
+      </a:fillRef>
+      <a:effectRef idx="0">
+        <a:scrgbClr r="0" g="0" b="0"/>
+      </a:effectRef>
+      <a:fontRef idx="minor"/>
+    </dgm:style>
+  </dgm:styleLbl>
+  <dgm:styleLbl name="solidAlignAcc1">
+    <dgm:scene3d>
+      <a:camera prst="orthographicFront"/>
+      <a:lightRig rig="threePt" dir="t"/>
+    </dgm:scene3d>
+    <dgm:sp3d/>
+    <dgm:txPr/>
+    <dgm:style>
+      <a:lnRef idx="2">
+        <a:scrgbClr r="0" g="0" b="0"/>
+      </a:lnRef>
+      <a:fillRef idx="1">
+        <a:scrgbClr r="0" g="0" b="0"/>
+      </a:fillRef>
+      <a:effectRef idx="0">
+        <a:scrgbClr r="0" g="0" b="0"/>
+      </a:effectRef>
+      <a:fontRef idx="minor"/>
+    </dgm:style>
+  </dgm:styleLbl>
+  <dgm:styleLbl name="solidBgAcc1">
+    <dgm:scene3d>
+      <a:camera prst="orthographicFront"/>
+      <a:lightRig rig="threePt" dir="t"/>
+    </dgm:scene3d>
+    <dgm:sp3d/>
+    <dgm:txPr/>
+    <dgm:style>
+      <a:lnRef idx="2">
+        <a:scrgbClr r="0" g="0" b="0"/>
+      </a:lnRef>
+      <a:fillRef idx="1">
+        <a:scrgbClr r="0" g="0" b="0"/>
+      </a:fillRef>
+      <a:effectRef idx="0">
+        <a:scrgbClr r="0" g="0" b="0"/>
+      </a:effectRef>
+      <a:fontRef idx="minor"/>
+    </dgm:style>
+  </dgm:styleLbl>
+  <dgm:styleLbl name="fgAccFollowNode1">
+    <dgm:scene3d>
+      <a:camera prst="orthographicFront"/>
+      <a:lightRig rig="threePt" dir="t"/>
+    </dgm:scene3d>
+    <dgm:sp3d/>
+    <dgm:txPr/>
+    <dgm:style>
+      <a:lnRef idx="2">
+        <a:scrgbClr r="0" g="0" b="0"/>
+      </a:lnRef>
+      <a:fillRef idx="1">
+        <a:scrgbClr r="0" g="0" b="0"/>
+      </a:fillRef>
+      <a:effectRef idx="0">
+        <a:scrgbClr r="0" g="0" b="0"/>
+      </a:effectRef>
+      <a:fontRef idx="minor"/>
+    </dgm:style>
+  </dgm:styleLbl>
+  <dgm:styleLbl name="alignAccFollowNode1">
+    <dgm:scene3d>
+      <a:camera prst="orthographicFront"/>
+      <a:lightRig rig="threePt" dir="t"/>
+    </dgm:scene3d>
+    <dgm:sp3d/>
+    <dgm:txPr/>
+    <dgm:style>
+      <a:lnRef idx="2">
+        <a:scrgbClr r="0" g="0" b="0"/>
+      </a:lnRef>
+      <a:fillRef idx="1">
+        <a:scrgbClr r="0" g="0" b="0"/>
+      </a:fillRef>
+      <a:effectRef idx="0">
+        <a:scrgbClr r="0" g="0" b="0"/>
+      </a:effectRef>
+      <a:fontRef idx="minor"/>
+    </dgm:style>
+  </dgm:styleLbl>
+  <dgm:styleLbl name="bgAccFollowNode1">
+    <dgm:scene3d>
+      <a:camera prst="orthographicFront"/>
+      <a:lightRig rig="threePt" dir="t"/>
+    </dgm:scene3d>
+    <dgm:sp3d/>
+    <dgm:txPr/>
+    <dgm:style>
+      <a:lnRef idx="2">
+        <a:scrgbClr r="0" g="0" b="0"/>
+      </a:lnRef>
+      <a:fillRef idx="1">
+        <a:scrgbClr r="0" g="0" b="0"/>
+      </a:fillRef>
+      <a:effectRef idx="0">
+        <a:scrgbClr r="0" g="0" b="0"/>
+      </a:effectRef>
+      <a:fontRef idx="minor"/>
+    </dgm:style>
+  </dgm:styleLbl>
+  <dgm:styleLbl name="fgAcc0">
+    <dgm:scene3d>
+      <a:camera prst="orthographicFront"/>
+      <a:lightRig rig="threePt" dir="t"/>
+    </dgm:scene3d>
+    <dgm:sp3d/>
+    <dgm:txPr/>
+    <dgm:style>
+      <a:lnRef idx="2">
+        <a:scrgbClr r="0" g="0" b="0"/>
+      </a:lnRef>
+      <a:fillRef idx="1">
+        <a:scrgbClr r="0" g="0" b="0"/>
+      </a:fillRef>
+      <a:effectRef idx="0">
+        <a:scrgbClr r="0" g="0" b="0"/>
+      </a:effectRef>
+      <a:fontRef idx="minor"/>
+    </dgm:style>
+  </dgm:styleLbl>
+  <dgm:styleLbl name="fgAcc2">
+    <dgm:scene3d>
+      <a:camera prst="orthographicFront"/>
+      <a:lightRig rig="threePt" dir="t"/>
+    </dgm:scene3d>
+    <dgm:sp3d/>
+    <dgm:txPr/>
+    <dgm:style>
+      <a:lnRef idx="2">
+        <a:scrgbClr r="0" g="0" b="0"/>
+      </a:lnRef>
+      <a:fillRef idx="1">
+        <a:scrgbClr r="0" g="0" b="0"/>
+      </a:fillRef>
+      <a:effectRef idx="0">
+        <a:scrgbClr r="0" g="0" b="0"/>
+      </a:effectRef>
+      <a:fontRef idx="minor"/>
+    </dgm:style>
+  </dgm:styleLbl>
+  <dgm:styleLbl name="fgAcc3">
+    <dgm:scene3d>
+      <a:camera prst="orthographicFront"/>
+      <a:lightRig rig="threePt" dir="t"/>
+    </dgm:scene3d>
+    <dgm:sp3d/>
+    <dgm:txPr/>
+    <dgm:style>
+      <a:lnRef idx="2">
+        <a:scrgbClr r="0" g="0" b="0"/>
+      </a:lnRef>
+      <a:fillRef idx="1">
+        <a:scrgbClr r="0" g="0" b="0"/>
+      </a:fillRef>
+      <a:effectRef idx="0">
+        <a:scrgbClr r="0" g="0" b="0"/>
+      </a:effectRef>
+      <a:fontRef idx="minor"/>
+    </dgm:style>
+  </dgm:styleLbl>
+  <dgm:styleLbl name="fgAcc4">
+    <dgm:scene3d>
+      <a:camera prst="orthographicFront"/>
+      <a:lightRig rig="threePt" dir="t"/>
+    </dgm:scene3d>
+    <dgm:sp3d/>
+    <dgm:txPr/>
+    <dgm:style>
+      <a:lnRef idx="2">
+        <a:scrgbClr r="0" g="0" b="0"/>
+      </a:lnRef>
+      <a:fillRef idx="1">
+        <a:scrgbClr r="0" g="0" b="0"/>
+      </a:fillRef>
+      <a:effectRef idx="0">
+        <a:scrgbClr r="0" g="0" b="0"/>
+      </a:effectRef>
+      <a:fontRef idx="minor"/>
+    </dgm:style>
+  </dgm:styleLbl>
+  <dgm:styleLbl name="bgShp">
+    <dgm:scene3d>
+      <a:camera prst="orthographicFront"/>
+      <a:lightRig rig="threePt" dir="t"/>
+    </dgm:scene3d>
+    <dgm:sp3d/>
+    <dgm:txPr/>
+    <dgm:style>
+      <a:lnRef idx="0">
+        <a:scrgbClr r="0" g="0" b="0"/>
+      </a:lnRef>
+      <a:fillRef idx="1">
+        <a:scrgbClr r="0" g="0" b="0"/>
+      </a:fillRef>
+      <a:effectRef idx="0">
+        <a:scrgbClr r="0" g="0" b="0"/>
+      </a:effectRef>
+      <a:fontRef idx="minor"/>
+    </dgm:style>
+  </dgm:styleLbl>
+  <dgm:styleLbl name="dkBgShp">
+    <dgm:scene3d>
+      <a:camera prst="orthographicFront"/>
+      <a:lightRig rig="threePt" dir="t"/>
+    </dgm:scene3d>
+    <dgm:sp3d/>
+    <dgm:txPr/>
+    <dgm:style>
+      <a:lnRef idx="0">
+        <a:scrgbClr r="0" g="0" b="0"/>
+      </a:lnRef>
+      <a:fillRef idx="1">
+        <a:scrgbClr r="0" g="0" b="0"/>
+      </a:fillRef>
+      <a:effectRef idx="0">
+        <a:scrgbClr r="0" g="0" b="0"/>
+      </a:effectRef>
+      <a:fontRef idx="minor"/>
+    </dgm:style>
+  </dgm:styleLbl>
+  <dgm:styleLbl name="trBgShp">
+    <dgm:scene3d>
+      <a:camera prst="orthographicFront"/>
+      <a:lightRig rig="threePt" dir="t"/>
+    </dgm:scene3d>
+    <dgm:sp3d/>
+    <dgm:txPr/>
+    <dgm:style>
+      <a:lnRef idx="0">
+        <a:scrgbClr r="0" g="0" b="0"/>
+      </a:lnRef>
+      <a:fillRef idx="1">
+        <a:scrgbClr r="0" g="0" b="0"/>
+      </a:fillRef>
+      <a:effectRef idx="0">
+        <a:scrgbClr r="0" g="0" b="0"/>
+      </a:effectRef>
+      <a:fontRef idx="minor"/>
+    </dgm:style>
+  </dgm:styleLbl>
+  <dgm:styleLbl name="fgShp">
+    <dgm:scene3d>
+      <a:camera prst="orthographicFront"/>
+      <a:lightRig rig="threePt" dir="t"/>
+    </dgm:scene3d>
+    <dgm:sp3d/>
+    <dgm:txPr/>
+    <dgm:style>
+      <a:lnRef idx="2">
+        <a:scrgbClr r="0" g="0" b="0"/>
+      </a:lnRef>
+      <a:fillRef idx="1">
+        <a:scrgbClr r="0" g="0" b="0"/>
+      </a:fillRef>
+      <a:effectRef idx="0">
+        <a:scrgbClr r="0" g="0" b="0"/>
+      </a:effectRef>
+      <a:fontRef idx="minor"/>
+    </dgm:style>
+  </dgm:styleLbl>
+  <dgm:styleLbl name="revTx">
+    <dgm:scene3d>
+      <a:camera prst="orthographicFront"/>
+      <a:lightRig rig="threePt" dir="t"/>
+    </dgm:scene3d>
+    <dgm:sp3d/>
+    <dgm:txPr/>
+    <dgm:style>
+      <a:lnRef idx="0">
+        <a:scrgbClr r="0" g="0" b="0"/>
+      </a:lnRef>
+      <a:fillRef idx="0">
+        <a:scrgbClr r="0" g="0" b="0"/>
+      </a:fillRef>
+      <a:effectRef idx="0">
+        <a:scrgbClr r="0" g="0" b="0"/>
+      </a:effectRef>
+      <a:fontRef idx="minor"/>
+    </dgm:style>
+  </dgm:styleLbl>
+</dgm:styleDef>
+</file>
+
+<file path=ppt/diagrams/quickStyle2.xml><?xml version="1.0" encoding="utf-8"?>
 <dgm:styleDef xmlns:dgm="http://schemas.openxmlformats.org/drawingml/2006/diagram" xmlns:a="http://schemas.openxmlformats.org/drawingml/2006/main" uniqueId="urn:microsoft.com/office/officeart/2005/8/quickstyle/simple1">
   <dgm:title val=""/>
   <dgm:desc val=""/>
@@ -2720,7 +5210,7 @@
           <a:p>
             <a:fld id="{4AC6A643-3419-45F4-B553-75BCCA386E45}" type="datetimeFigureOut">
               <a:rPr lang="es-ES" smtClean="0"/>
-              <a:t>25/04/2020</a:t>
+              <a:t>27/04/2020</a:t>
             </a:fld>
             <a:endParaRPr lang="es-ES"/>
           </a:p>
@@ -2898,7 +5388,7 @@
           <a:p>
             <a:fld id="{2BEEC562-E98B-4629-A585-2BFC8D8FC9FA}" type="datetimeFigureOut">
               <a:rPr lang="es-ES" smtClean="0"/>
-              <a:t>25/04/2020</a:t>
+              <a:t>27/04/2020</a:t>
             </a:fld>
             <a:endParaRPr lang="es-ES" dirty="0"/>
           </a:p>
@@ -3736,7 +6226,7 @@
           <a:p>
             <a:fld id="{075FE43F-4142-4D4B-A0AD-9D5D00DD710F}" type="slidenum">
               <a:rPr lang="es-ES" smtClean="0"/>
-              <a:t>15</a:t>
+              <a:t>16</a:t>
             </a:fld>
             <a:endParaRPr lang="es-ES"/>
           </a:p>
@@ -3745,7 +6235,7 @@
     </p:spTree>
     <p:extLst>
       <p:ext uri="{BB962C8B-B14F-4D97-AF65-F5344CB8AC3E}">
-        <p14:creationId xmlns:p14="http://schemas.microsoft.com/office/powerpoint/2010/main" val="3191931434"/>
+        <p14:creationId xmlns:p14="http://schemas.microsoft.com/office/powerpoint/2010/main" val="389122678"/>
       </p:ext>
     </p:extLst>
   </p:cSld>
@@ -3820,7 +6310,7 @@
           <a:p>
             <a:fld id="{075FE43F-4142-4D4B-A0AD-9D5D00DD710F}" type="slidenum">
               <a:rPr lang="es-ES" smtClean="0"/>
-              <a:t>16</a:t>
+              <a:t>17</a:t>
             </a:fld>
             <a:endParaRPr lang="es-ES"/>
           </a:p>
@@ -3829,7 +6319,7 @@
     </p:spTree>
     <p:extLst>
       <p:ext uri="{BB962C8B-B14F-4D97-AF65-F5344CB8AC3E}">
-        <p14:creationId xmlns:p14="http://schemas.microsoft.com/office/powerpoint/2010/main" val="1617546562"/>
+        <p14:creationId xmlns:p14="http://schemas.microsoft.com/office/powerpoint/2010/main" val="3191931434"/>
       </p:ext>
     </p:extLst>
   </p:cSld>
@@ -3904,7 +6394,7 @@
           <a:p>
             <a:fld id="{075FE43F-4142-4D4B-A0AD-9D5D00DD710F}" type="slidenum">
               <a:rPr lang="es-ES" smtClean="0"/>
-              <a:t>17</a:t>
+              <a:t>18</a:t>
             </a:fld>
             <a:endParaRPr lang="es-ES"/>
           </a:p>
@@ -3913,7 +6403,7 @@
     </p:spTree>
     <p:extLst>
       <p:ext uri="{BB962C8B-B14F-4D97-AF65-F5344CB8AC3E}">
-        <p14:creationId xmlns:p14="http://schemas.microsoft.com/office/powerpoint/2010/main" val="2326766684"/>
+        <p14:creationId xmlns:p14="http://schemas.microsoft.com/office/powerpoint/2010/main" val="1617546562"/>
       </p:ext>
     </p:extLst>
   </p:cSld>
@@ -3988,7 +6478,91 @@
           <a:p>
             <a:fld id="{075FE43F-4142-4D4B-A0AD-9D5D00DD710F}" type="slidenum">
               <a:rPr lang="es-ES" smtClean="0"/>
-              <a:t>18</a:t>
+              <a:t>19</a:t>
+            </a:fld>
+            <a:endParaRPr lang="es-ES"/>
+          </a:p>
+        </p:txBody>
+      </p:sp>
+    </p:spTree>
+    <p:extLst>
+      <p:ext uri="{BB962C8B-B14F-4D97-AF65-F5344CB8AC3E}">
+        <p14:creationId xmlns:p14="http://schemas.microsoft.com/office/powerpoint/2010/main" val="2326766684"/>
+      </p:ext>
+    </p:extLst>
+  </p:cSld>
+  <p:clrMapOvr>
+    <a:masterClrMapping/>
+  </p:clrMapOvr>
+</p:notes>
+</file>
+
+<file path=ppt/notesSlides/notesSlide19.xml><?xml version="1.0" encoding="utf-8"?>
+<p:notes xmlns:a="http://schemas.openxmlformats.org/drawingml/2006/main" xmlns:r="http://schemas.openxmlformats.org/officeDocument/2006/relationships" xmlns:p="http://schemas.openxmlformats.org/presentationml/2006/main">
+  <p:cSld>
+    <p:spTree>
+      <p:nvGrpSpPr>
+        <p:cNvPr id="1" name=""/>
+        <p:cNvGrpSpPr/>
+        <p:nvPr/>
+      </p:nvGrpSpPr>
+      <p:grpSpPr>
+        <a:xfrm>
+          <a:off x="0" y="0"/>
+          <a:ext cx="0" cy="0"/>
+          <a:chOff x="0" y="0"/>
+          <a:chExt cx="0" cy="0"/>
+        </a:xfrm>
+      </p:grpSpPr>
+      <p:sp>
+        <p:nvSpPr>
+          <p:cNvPr id="2" name="Marcador de imagen de diapositiva 1"/>
+          <p:cNvSpPr>
+            <a:spLocks noGrp="1" noRot="1" noChangeAspect="1"/>
+          </p:cNvSpPr>
+          <p:nvPr>
+            <p:ph type="sldImg"/>
+          </p:nvPr>
+        </p:nvSpPr>
+        <p:spPr/>
+      </p:sp>
+      <p:sp>
+        <p:nvSpPr>
+          <p:cNvPr id="3" name="Marcador de notas 2"/>
+          <p:cNvSpPr>
+            <a:spLocks noGrp="1"/>
+          </p:cNvSpPr>
+          <p:nvPr>
+            <p:ph type="body" idx="1"/>
+          </p:nvPr>
+        </p:nvSpPr>
+        <p:spPr/>
+        <p:txBody>
+          <a:bodyPr/>
+          <a:lstStyle/>
+          <a:p>
+            <a:endParaRPr lang="es-ES"/>
+          </a:p>
+        </p:txBody>
+      </p:sp>
+      <p:sp>
+        <p:nvSpPr>
+          <p:cNvPr id="4" name="Marcador de número de diapositiva 3"/>
+          <p:cNvSpPr>
+            <a:spLocks noGrp="1"/>
+          </p:cNvSpPr>
+          <p:nvPr>
+            <p:ph type="sldNum" sz="quarter" idx="5"/>
+          </p:nvPr>
+        </p:nvSpPr>
+        <p:spPr/>
+        <p:txBody>
+          <a:bodyPr/>
+          <a:lstStyle/>
+          <a:p>
+            <a:fld id="{075FE43F-4142-4D4B-A0AD-9D5D00DD710F}" type="slidenum">
+              <a:rPr lang="es-ES" smtClean="0"/>
+              <a:t>20</a:t>
             </a:fld>
             <a:endParaRPr lang="es-ES"/>
           </a:p>
@@ -4829,7 +7403,7 @@
             <a:pPr rtl="0"/>
             <a:fld id="{4EC8BC34-FAE1-4B74-A869-63E1C91B7FA3}" type="datetime1">
               <a:rPr lang="es-ES" noProof="0" smtClean="0"/>
-              <a:t>25/04/2020</a:t>
+              <a:t>27/04/2020</a:t>
             </a:fld>
             <a:endParaRPr lang="es-ES" noProof="0"/>
           </a:p>
@@ -5031,7 +7605,7 @@
             <a:pPr rtl="0"/>
             <a:fld id="{4A11FFD9-C657-4FF3-B2E0-E8D0B3687E72}" type="datetime1">
               <a:rPr lang="es-ES" noProof="0" smtClean="0"/>
-              <a:t>25/04/2020</a:t>
+              <a:t>27/04/2020</a:t>
             </a:fld>
             <a:endParaRPr lang="es-ES" noProof="0"/>
           </a:p>
@@ -5243,7 +7817,7 @@
             <a:pPr rtl="0"/>
             <a:fld id="{0BE2F805-28F1-44E6-A52A-18D45DADA502}" type="datetime1">
               <a:rPr lang="es-ES" noProof="0" smtClean="0"/>
-              <a:t>25/04/2020</a:t>
+              <a:t>27/04/2020</a:t>
             </a:fld>
             <a:endParaRPr lang="es-ES" noProof="0"/>
           </a:p>
@@ -5445,7 +8019,7 @@
             <a:pPr rtl="0"/>
             <a:fld id="{1222D5E5-D2F4-478F-BA70-17A7C3E79E1E}" type="datetime1">
               <a:rPr lang="es-ES" noProof="0" smtClean="0"/>
-              <a:t>25/04/2020</a:t>
+              <a:t>27/04/2020</a:t>
             </a:fld>
             <a:endParaRPr lang="es-ES" noProof="0"/>
           </a:p>
@@ -5724,7 +8298,7 @@
             <a:pPr rtl="0"/>
             <a:fld id="{B6F4D31C-9366-46BD-8469-9DC1CD8DE170}" type="datetime1">
               <a:rPr lang="es-ES" noProof="0" smtClean="0"/>
-              <a:t>25/04/2020</a:t>
+              <a:t>27/04/2020</a:t>
             </a:fld>
             <a:endParaRPr lang="es-ES" noProof="0"/>
           </a:p>
@@ -5993,7 +8567,7 @@
             <a:pPr rtl="0"/>
             <a:fld id="{D3898C5E-E4C9-4990-9DEE-C2FCAB07CC56}" type="datetime1">
               <a:rPr lang="es-ES" noProof="0" smtClean="0"/>
-              <a:t>25/04/2020</a:t>
+              <a:t>27/04/2020</a:t>
             </a:fld>
             <a:endParaRPr lang="es-ES" noProof="0"/>
           </a:p>
@@ -6409,7 +8983,7 @@
             <a:pPr rtl="0"/>
             <a:fld id="{BE334D48-C590-4FC7-AF46-3A34805DB4A9}" type="datetime1">
               <a:rPr lang="es-ES" noProof="0" smtClean="0"/>
-              <a:t>25/04/2020</a:t>
+              <a:t>27/04/2020</a:t>
             </a:fld>
             <a:endParaRPr lang="es-ES" noProof="0"/>
           </a:p>
@@ -6554,7 +9128,7 @@
             <a:pPr rtl="0"/>
             <a:fld id="{CCF60B4A-FFB5-4BB1-8DB6-554048969AB4}" type="datetime1">
               <a:rPr lang="es-ES" noProof="0" smtClean="0"/>
-              <a:t>25/04/2020</a:t>
+              <a:t>27/04/2020</a:t>
             </a:fld>
             <a:endParaRPr lang="es-ES" noProof="0"/>
           </a:p>
@@ -6670,7 +9244,7 @@
             <a:pPr rtl="0"/>
             <a:fld id="{AC84FAA9-E4C7-44EB-BEC7-6C36C851AC0A}" type="datetime1">
               <a:rPr lang="es-ES" noProof="0" smtClean="0"/>
-              <a:t>25/04/2020</a:t>
+              <a:t>27/04/2020</a:t>
             </a:fld>
             <a:endParaRPr lang="es-ES" noProof="0"/>
           </a:p>
@@ -6985,7 +9559,7 @@
             <a:pPr rtl="0"/>
             <a:fld id="{6D90FD0C-76BF-4D79-8B03-20A9409B192A}" type="datetime1">
               <a:rPr lang="es-ES" noProof="0" smtClean="0"/>
-              <a:t>25/04/2020</a:t>
+              <a:t>27/04/2020</a:t>
             </a:fld>
             <a:endParaRPr lang="es-ES" noProof="0"/>
           </a:p>
@@ -7281,7 +9855,7 @@
             <a:pPr rtl="0"/>
             <a:fld id="{944C90AB-CD15-42C7-97DB-DB983848D012}" type="datetime1">
               <a:rPr lang="es-ES" noProof="0" smtClean="0"/>
-              <a:t>25/04/2020</a:t>
+              <a:t>27/04/2020</a:t>
             </a:fld>
             <a:endParaRPr lang="es-ES" noProof="0"/>
           </a:p>
@@ -7526,7 +10100,7 @@
             <a:pPr rtl="0"/>
             <a:fld id="{A656FADD-D8DC-4325-83CE-E689BEB1B172}" type="datetime1">
               <a:rPr lang="es-ES" noProof="0" smtClean="0"/>
-              <a:t>25/04/2020</a:t>
+              <a:t>27/04/2020</a:t>
             </a:fld>
             <a:endParaRPr lang="es-ES" noProof="0"/>
           </a:p>
@@ -10807,7 +13381,7 @@
                 </a:solidFill>
                 <a:latin typeface="Rockwell" panose="02060603020205020403" pitchFamily="18" charset="0"/>
               </a:rPr>
-              <a:t>91%</a:t>
+              <a:t>92%</a:t>
             </a:r>
           </a:p>
           <a:p>
@@ -10895,6 +13469,721 @@
           <a:chExt cx="0" cy="0"/>
         </a:xfrm>
       </p:grpSpPr>
+      <p:pic>
+        <p:nvPicPr>
+          <p:cNvPr id="1026" name="Picture 2">
+            <a:extLst>
+              <a:ext uri="{FF2B5EF4-FFF2-40B4-BE49-F238E27FC236}">
+                <a16:creationId xmlns:a16="http://schemas.microsoft.com/office/drawing/2014/main" id="{C2E2EB22-8655-4366-BF11-8BB61E7B94FC}"/>
+              </a:ext>
+            </a:extLst>
+          </p:cNvPr>
+          <p:cNvPicPr>
+            <a:picLocks noChangeAspect="1" noChangeArrowheads="1"/>
+          </p:cNvPicPr>
+          <p:nvPr/>
+        </p:nvPicPr>
+        <p:blipFill>
+          <a:blip r:embed="rId2">
+            <a:extLst>
+              <a:ext uri="{BEBA8EAE-BF5A-486C-A8C5-ECC9F3942E4B}">
+                <a14:imgProps xmlns:a14="http://schemas.microsoft.com/office/drawing/2010/main">
+                  <a14:imgLayer r:embed="rId3">
+                    <a14:imgEffect>
+                      <a14:brightnessContrast contrast="-40000"/>
+                    </a14:imgEffect>
+                  </a14:imgLayer>
+                </a14:imgProps>
+              </a:ext>
+              <a:ext uri="{28A0092B-C50C-407E-A947-70E740481C1C}">
+                <a14:useLocalDpi xmlns:a14="http://schemas.microsoft.com/office/drawing/2010/main" val="0"/>
+              </a:ext>
+            </a:extLst>
+          </a:blip>
+          <a:srcRect/>
+          <a:stretch>
+            <a:fillRect/>
+          </a:stretch>
+        </p:blipFill>
+        <p:spPr bwMode="auto">
+          <a:xfrm>
+            <a:off x="1351671" y="-1"/>
+            <a:ext cx="8566052" cy="6900045"/>
+          </a:xfrm>
+          <a:prstGeom prst="rect">
+            <a:avLst/>
+          </a:prstGeom>
+          <a:noFill/>
+          <a:extLst>
+            <a:ext uri="{909E8E84-426E-40DD-AFC4-6F175D3DCCD1}">
+              <a14:hiddenFill xmlns:a14="http://schemas.microsoft.com/office/drawing/2010/main">
+                <a:solidFill>
+                  <a:srgbClr val="FFFFFF"/>
+                </a:solidFill>
+              </a14:hiddenFill>
+            </a:ext>
+          </a:extLst>
+        </p:spPr>
+      </p:pic>
+    </p:spTree>
+    <p:extLst>
+      <p:ext uri="{BB962C8B-B14F-4D97-AF65-F5344CB8AC3E}">
+        <p14:creationId xmlns:p14="http://schemas.microsoft.com/office/powerpoint/2010/main" val="520482710"/>
+      </p:ext>
+    </p:extLst>
+  </p:cSld>
+  <p:clrMapOvr>
+    <a:masterClrMapping/>
+  </p:clrMapOvr>
+</p:sld>
+</file>
+
+<file path=ppt/slides/slide16.xml><?xml version="1.0" encoding="utf-8"?>
+<p:sld xmlns:a="http://schemas.openxmlformats.org/drawingml/2006/main" xmlns:r="http://schemas.openxmlformats.org/officeDocument/2006/relationships" xmlns:p="http://schemas.openxmlformats.org/presentationml/2006/main">
+  <p:cSld>
+    <p:spTree>
+      <p:nvGrpSpPr>
+        <p:cNvPr id="1" name=""/>
+        <p:cNvGrpSpPr/>
+        <p:nvPr/>
+      </p:nvGrpSpPr>
+      <p:grpSpPr>
+        <a:xfrm>
+          <a:off x="0" y="0"/>
+          <a:ext cx="0" cy="0"/>
+          <a:chOff x="0" y="0"/>
+          <a:chExt cx="0" cy="0"/>
+        </a:xfrm>
+      </p:grpSpPr>
+      <p:sp>
+        <p:nvSpPr>
+          <p:cNvPr id="2" name="Título 1">
+            <a:extLst>
+              <a:ext uri="{FF2B5EF4-FFF2-40B4-BE49-F238E27FC236}">
+                <a16:creationId xmlns:a16="http://schemas.microsoft.com/office/drawing/2014/main" id="{10742257-3980-4551-868A-26DC3CB821EE}"/>
+              </a:ext>
+            </a:extLst>
+          </p:cNvPr>
+          <p:cNvSpPr>
+            <a:spLocks noGrp="1"/>
+          </p:cNvSpPr>
+          <p:nvPr>
+            <p:ph type="title"/>
+          </p:nvPr>
+        </p:nvSpPr>
+        <p:spPr>
+          <a:xfrm>
+            <a:off x="521284" y="365125"/>
+            <a:ext cx="8108513" cy="1027257"/>
+          </a:xfrm>
+        </p:spPr>
+        <p:txBody>
+          <a:bodyPr rtlCol="0">
+            <a:normAutofit/>
+          </a:bodyPr>
+          <a:lstStyle/>
+          <a:p>
+            <a:pPr rtl="0"/>
+            <a:r>
+              <a:rPr lang="es-ES" spc="-30" dirty="0">
+                <a:solidFill>
+                  <a:schemeClr val="accent5">
+                    <a:lumMod val="50000"/>
+                  </a:schemeClr>
+                </a:solidFill>
+                <a:latin typeface="Rockwell" panose="02060603020205020403" pitchFamily="18" charset="0"/>
+              </a:rPr>
+              <a:t>Modelo con submuestreo</a:t>
+            </a:r>
+          </a:p>
+        </p:txBody>
+      </p:sp>
+      <p:sp>
+        <p:nvSpPr>
+          <p:cNvPr id="3" name="Marcador de contenido 2">
+            <a:extLst>
+              <a:ext uri="{FF2B5EF4-FFF2-40B4-BE49-F238E27FC236}">
+                <a16:creationId xmlns:a16="http://schemas.microsoft.com/office/drawing/2014/main" id="{B57E0B0F-4D29-4786-B2AB-B84D9F8B5429}"/>
+              </a:ext>
+            </a:extLst>
+          </p:cNvPr>
+          <p:cNvSpPr>
+            <a:spLocks noGrp="1"/>
+          </p:cNvSpPr>
+          <p:nvPr>
+            <p:ph idx="1"/>
+          </p:nvPr>
+        </p:nvSpPr>
+        <p:spPr>
+          <a:xfrm>
+            <a:off x="631410" y="1265189"/>
+            <a:ext cx="7210715" cy="796908"/>
+          </a:xfrm>
+        </p:spPr>
+        <p:txBody>
+          <a:bodyPr rtlCol="0">
+            <a:normAutofit lnSpcReduction="10000"/>
+          </a:bodyPr>
+          <a:lstStyle/>
+          <a:p>
+            <a:pPr marL="0" indent="0" rtl="0">
+              <a:buNone/>
+            </a:pPr>
+            <a:r>
+              <a:rPr lang="es-ES" sz="1800" dirty="0">
+                <a:solidFill>
+                  <a:schemeClr val="accent5">
+                    <a:lumMod val="50000"/>
+                  </a:schemeClr>
+                </a:solidFill>
+                <a:latin typeface="Tahoma" panose="020B0604030504040204" pitchFamily="34" charset="0"/>
+                <a:ea typeface="Tahoma" panose="020B0604030504040204" pitchFamily="34" charset="0"/>
+                <a:cs typeface="Tahoma" panose="020B0604030504040204" pitchFamily="34" charset="0"/>
+              </a:rPr>
+              <a:t>Debido a que las clases no están distribuidas igualmente se intentó hacer un modelo exactamente igual sólo que con un entrenamiento </a:t>
+            </a:r>
+            <a:r>
+              <a:rPr lang="es-ES" sz="1800" i="1" dirty="0" err="1">
+                <a:solidFill>
+                  <a:schemeClr val="accent5">
+                    <a:lumMod val="50000"/>
+                  </a:schemeClr>
+                </a:solidFill>
+                <a:latin typeface="Tahoma" panose="020B0604030504040204" pitchFamily="34" charset="0"/>
+                <a:ea typeface="Tahoma" panose="020B0604030504040204" pitchFamily="34" charset="0"/>
+                <a:cs typeface="Tahoma" panose="020B0604030504040204" pitchFamily="34" charset="0"/>
+              </a:rPr>
+              <a:t>submuestreado</a:t>
+            </a:r>
+            <a:r>
+              <a:rPr lang="es-ES" sz="1800" i="1" dirty="0">
+                <a:solidFill>
+                  <a:schemeClr val="accent5">
+                    <a:lumMod val="50000"/>
+                  </a:schemeClr>
+                </a:solidFill>
+                <a:latin typeface="Tahoma" panose="020B0604030504040204" pitchFamily="34" charset="0"/>
+                <a:ea typeface="Tahoma" panose="020B0604030504040204" pitchFamily="34" charset="0"/>
+                <a:cs typeface="Tahoma" panose="020B0604030504040204" pitchFamily="34" charset="0"/>
+              </a:rPr>
+              <a:t>.</a:t>
+            </a:r>
+          </a:p>
+        </p:txBody>
+      </p:sp>
+      <p:grpSp>
+        <p:nvGrpSpPr>
+          <p:cNvPr id="9" name="Grupo 8">
+            <a:extLst>
+              <a:ext uri="{FF2B5EF4-FFF2-40B4-BE49-F238E27FC236}">
+                <a16:creationId xmlns:a16="http://schemas.microsoft.com/office/drawing/2014/main" id="{AEA098C1-E19E-4D03-9A35-14569BC7C142}"/>
+              </a:ext>
+              <a:ext uri="{C183D7F6-B498-43B3-948B-1728B52AA6E4}">
+                <adec:decorative xmlns:adec="http://schemas.microsoft.com/office/drawing/2017/decorative" val="1"/>
+              </a:ext>
+            </a:extLst>
+          </p:cNvPr>
+          <p:cNvGrpSpPr/>
+          <p:nvPr/>
+        </p:nvGrpSpPr>
+        <p:grpSpPr>
+          <a:xfrm>
+            <a:off x="8899813" y="0"/>
+            <a:ext cx="3884322" cy="6858000"/>
+            <a:chOff x="8899813" y="0"/>
+            <a:chExt cx="3884322" cy="6858000"/>
+          </a:xfrm>
+        </p:grpSpPr>
+        <p:grpSp>
+          <p:nvGrpSpPr>
+            <p:cNvPr id="10" name="Grupo 9">
+              <a:extLst>
+                <a:ext uri="{FF2B5EF4-FFF2-40B4-BE49-F238E27FC236}">
+                  <a16:creationId xmlns:a16="http://schemas.microsoft.com/office/drawing/2014/main" id="{D4EF09CF-3362-453A-9463-F6669A9D3E01}"/>
+                </a:ext>
+              </a:extLst>
+            </p:cNvPr>
+            <p:cNvGrpSpPr/>
+            <p:nvPr/>
+          </p:nvGrpSpPr>
+          <p:grpSpPr>
+            <a:xfrm>
+              <a:off x="9055676" y="0"/>
+              <a:ext cx="3136324" cy="6858000"/>
+              <a:chOff x="9055676" y="0"/>
+              <a:chExt cx="3136324" cy="6858000"/>
+            </a:xfrm>
+          </p:grpSpPr>
+          <p:sp>
+            <p:nvSpPr>
+              <p:cNvPr id="4" name="Rectángulo 3">
+                <a:extLst>
+                  <a:ext uri="{FF2B5EF4-FFF2-40B4-BE49-F238E27FC236}">
+                    <a16:creationId xmlns:a16="http://schemas.microsoft.com/office/drawing/2014/main" id="{403AE892-EBD6-40F1-851B-FEADBD59429F}"/>
+                  </a:ext>
+                </a:extLst>
+              </p:cNvPr>
+              <p:cNvSpPr/>
+              <p:nvPr/>
+            </p:nvSpPr>
+            <p:spPr>
+              <a:xfrm>
+                <a:off x="9221932" y="0"/>
+                <a:ext cx="2970068" cy="6858000"/>
+              </a:xfrm>
+              <a:prstGeom prst="rect">
+                <a:avLst/>
+              </a:prstGeom>
+              <a:solidFill>
+                <a:schemeClr val="accent5">
+                  <a:lumMod val="50000"/>
+                </a:schemeClr>
+              </a:solidFill>
+              <a:ln>
+                <a:noFill/>
+              </a:ln>
+            </p:spPr>
+            <p:style>
+              <a:lnRef idx="2">
+                <a:schemeClr val="accent1">
+                  <a:shade val="50000"/>
+                </a:schemeClr>
+              </a:lnRef>
+              <a:fillRef idx="1">
+                <a:schemeClr val="accent1"/>
+              </a:fillRef>
+              <a:effectRef idx="0">
+                <a:schemeClr val="accent1"/>
+              </a:effectRef>
+              <a:fontRef idx="minor">
+                <a:schemeClr val="lt1"/>
+              </a:fontRef>
+            </p:style>
+            <p:txBody>
+              <a:bodyPr rtlCol="0" anchor="ctr"/>
+              <a:lstStyle/>
+              <a:p>
+                <a:pPr algn="ctr" rtl="0"/>
+                <a:endParaRPr lang="es-ES" dirty="0"/>
+              </a:p>
+            </p:txBody>
+          </p:sp>
+          <p:sp>
+            <p:nvSpPr>
+              <p:cNvPr id="5" name="Rectángulo 4">
+                <a:extLst>
+                  <a:ext uri="{FF2B5EF4-FFF2-40B4-BE49-F238E27FC236}">
+                    <a16:creationId xmlns:a16="http://schemas.microsoft.com/office/drawing/2014/main" id="{54318653-1A38-442C-BA0F-F2C51149BCFF}"/>
+                  </a:ext>
+                </a:extLst>
+              </p:cNvPr>
+              <p:cNvSpPr/>
+              <p:nvPr/>
+            </p:nvSpPr>
+            <p:spPr>
+              <a:xfrm>
+                <a:off x="9055676" y="0"/>
+                <a:ext cx="166255" cy="6858000"/>
+              </a:xfrm>
+              <a:prstGeom prst="rect">
+                <a:avLst/>
+              </a:prstGeom>
+              <a:solidFill>
+                <a:schemeClr val="accent2"/>
+              </a:solidFill>
+              <a:ln>
+                <a:noFill/>
+              </a:ln>
+            </p:spPr>
+            <p:style>
+              <a:lnRef idx="2">
+                <a:schemeClr val="accent1">
+                  <a:shade val="50000"/>
+                </a:schemeClr>
+              </a:lnRef>
+              <a:fillRef idx="1">
+                <a:schemeClr val="accent1"/>
+              </a:fillRef>
+              <a:effectRef idx="0">
+                <a:schemeClr val="accent1"/>
+              </a:effectRef>
+              <a:fontRef idx="minor">
+                <a:schemeClr val="lt1"/>
+              </a:fontRef>
+            </p:style>
+            <p:txBody>
+              <a:bodyPr rtlCol="0" anchor="ctr"/>
+              <a:lstStyle/>
+              <a:p>
+                <a:pPr algn="ctr" rtl="0"/>
+                <a:endParaRPr lang="es-ES" dirty="0"/>
+              </a:p>
+            </p:txBody>
+          </p:sp>
+          <p:sp>
+            <p:nvSpPr>
+              <p:cNvPr id="6" name="Rectángulo 5">
+                <a:extLst>
+                  <a:ext uri="{FF2B5EF4-FFF2-40B4-BE49-F238E27FC236}">
+                    <a16:creationId xmlns:a16="http://schemas.microsoft.com/office/drawing/2014/main" id="{C25D63D1-E9CE-42BF-BD4D-374FD0293155}"/>
+                  </a:ext>
+                </a:extLst>
+              </p:cNvPr>
+              <p:cNvSpPr/>
+              <p:nvPr/>
+            </p:nvSpPr>
+            <p:spPr>
+              <a:xfrm>
+                <a:off x="9221932" y="0"/>
+                <a:ext cx="114301" cy="6858000"/>
+              </a:xfrm>
+              <a:prstGeom prst="rect">
+                <a:avLst/>
+              </a:prstGeom>
+              <a:solidFill>
+                <a:srgbClr val="FFD347"/>
+              </a:solidFill>
+              <a:ln>
+                <a:noFill/>
+              </a:ln>
+            </p:spPr>
+            <p:style>
+              <a:lnRef idx="2">
+                <a:schemeClr val="accent1">
+                  <a:shade val="50000"/>
+                </a:schemeClr>
+              </a:lnRef>
+              <a:fillRef idx="1">
+                <a:schemeClr val="accent1"/>
+              </a:fillRef>
+              <a:effectRef idx="0">
+                <a:schemeClr val="accent1"/>
+              </a:effectRef>
+              <a:fontRef idx="minor">
+                <a:schemeClr val="lt1"/>
+              </a:fontRef>
+            </p:style>
+            <p:txBody>
+              <a:bodyPr rtlCol="0" anchor="ctr"/>
+              <a:lstStyle/>
+              <a:p>
+                <a:pPr algn="ctr" rtl="0"/>
+                <a:endParaRPr lang="es-ES" dirty="0"/>
+              </a:p>
+            </p:txBody>
+          </p:sp>
+          <p:sp>
+            <p:nvSpPr>
+              <p:cNvPr id="7" name="Rectángulo 6">
+                <a:extLst>
+                  <a:ext uri="{FF2B5EF4-FFF2-40B4-BE49-F238E27FC236}">
+                    <a16:creationId xmlns:a16="http://schemas.microsoft.com/office/drawing/2014/main" id="{BA4EE865-9F0D-4531-A737-E13A557C0277}"/>
+                  </a:ext>
+                </a:extLst>
+              </p:cNvPr>
+              <p:cNvSpPr/>
+              <p:nvPr/>
+            </p:nvSpPr>
+            <p:spPr>
+              <a:xfrm>
+                <a:off x="9336233" y="0"/>
+                <a:ext cx="150667" cy="6858000"/>
+              </a:xfrm>
+              <a:prstGeom prst="rect">
+                <a:avLst/>
+              </a:prstGeom>
+              <a:solidFill>
+                <a:schemeClr val="accent6"/>
+              </a:solidFill>
+              <a:ln>
+                <a:noFill/>
+              </a:ln>
+            </p:spPr>
+            <p:style>
+              <a:lnRef idx="2">
+                <a:schemeClr val="accent1">
+                  <a:shade val="50000"/>
+                </a:schemeClr>
+              </a:lnRef>
+              <a:fillRef idx="1">
+                <a:schemeClr val="accent1"/>
+              </a:fillRef>
+              <a:effectRef idx="0">
+                <a:schemeClr val="accent1"/>
+              </a:effectRef>
+              <a:fontRef idx="minor">
+                <a:schemeClr val="lt1"/>
+              </a:fontRef>
+            </p:style>
+            <p:txBody>
+              <a:bodyPr rtlCol="0" anchor="ctr"/>
+              <a:lstStyle/>
+              <a:p>
+                <a:pPr algn="ctr" rtl="0"/>
+                <a:endParaRPr lang="es-ES" dirty="0"/>
+              </a:p>
+            </p:txBody>
+          </p:sp>
+          <p:sp>
+            <p:nvSpPr>
+              <p:cNvPr id="8" name="Rectángulo 7">
+                <a:extLst>
+                  <a:ext uri="{FF2B5EF4-FFF2-40B4-BE49-F238E27FC236}">
+                    <a16:creationId xmlns:a16="http://schemas.microsoft.com/office/drawing/2014/main" id="{6A1183CB-C5B0-498A-A49C-4180134C74B0}"/>
+                  </a:ext>
+                </a:extLst>
+              </p:cNvPr>
+              <p:cNvSpPr/>
+              <p:nvPr/>
+            </p:nvSpPr>
+            <p:spPr>
+              <a:xfrm>
+                <a:off x="9336233" y="0"/>
+                <a:ext cx="57150" cy="6858000"/>
+              </a:xfrm>
+              <a:prstGeom prst="rect">
+                <a:avLst/>
+              </a:prstGeom>
+              <a:solidFill>
+                <a:schemeClr val="bg1"/>
+              </a:solidFill>
+              <a:ln>
+                <a:noFill/>
+              </a:ln>
+            </p:spPr>
+            <p:style>
+              <a:lnRef idx="2">
+                <a:schemeClr val="accent1">
+                  <a:shade val="50000"/>
+                </a:schemeClr>
+              </a:lnRef>
+              <a:fillRef idx="1">
+                <a:schemeClr val="accent1"/>
+              </a:fillRef>
+              <a:effectRef idx="0">
+                <a:schemeClr val="accent1"/>
+              </a:effectRef>
+              <a:fontRef idx="minor">
+                <a:schemeClr val="lt1"/>
+              </a:fontRef>
+            </p:style>
+            <p:txBody>
+              <a:bodyPr rtlCol="0" anchor="ctr"/>
+              <a:lstStyle/>
+              <a:p>
+                <a:pPr algn="ctr" rtl="0"/>
+                <a:endParaRPr lang="es-ES" dirty="0"/>
+              </a:p>
+            </p:txBody>
+          </p:sp>
+        </p:grpSp>
+        <p:pic>
+          <p:nvPicPr>
+            <p:cNvPr id="13" name="Gráfico 12" descr="Vaso de precipitados">
+              <a:extLst>
+                <a:ext uri="{FF2B5EF4-FFF2-40B4-BE49-F238E27FC236}">
+                  <a16:creationId xmlns:a16="http://schemas.microsoft.com/office/drawing/2014/main" id="{BF2CC76A-FBA9-49E0-9F1C-2C5299495F4C}"/>
+                </a:ext>
+              </a:extLst>
+            </p:cNvPr>
+            <p:cNvPicPr>
+              <a:picLocks noChangeAspect="1"/>
+            </p:cNvPicPr>
+            <p:nvPr/>
+          </p:nvPicPr>
+          <p:blipFill>
+            <a:blip r:embed="rId3">
+              <a:extLst>
+                <a:ext uri="{28A0092B-C50C-407E-A947-70E740481C1C}">
+                  <a14:useLocalDpi xmlns:a14="http://schemas.microsoft.com/office/drawing/2010/main" val="0"/>
+                </a:ext>
+                <a:ext uri="{96DAC541-7B7A-43D3-8B79-37D633B846F1}">
+                  <asvg:svgBlip xmlns:asvg="http://schemas.microsoft.com/office/drawing/2016/SVG/main" r:embed="rId4"/>
+                </a:ext>
+              </a:extLst>
+            </a:blip>
+            <a:stretch>
+              <a:fillRect/>
+            </a:stretch>
+          </p:blipFill>
+          <p:spPr>
+            <a:xfrm>
+              <a:off x="8899813" y="2973678"/>
+              <a:ext cx="3884322" cy="3884322"/>
+            </a:xfrm>
+            <a:prstGeom prst="rect">
+              <a:avLst/>
+            </a:prstGeom>
+          </p:spPr>
+        </p:pic>
+      </p:grpSp>
+      <p:graphicFrame>
+        <p:nvGraphicFramePr>
+          <p:cNvPr id="11" name="Diagrama 10">
+            <a:extLst>
+              <a:ext uri="{FF2B5EF4-FFF2-40B4-BE49-F238E27FC236}">
+                <a16:creationId xmlns:a16="http://schemas.microsoft.com/office/drawing/2014/main" id="{D32CE14B-3BA1-4454-827F-251611057F3E}"/>
+              </a:ext>
+              <a:ext uri="{C183D7F6-B498-43B3-948B-1728B52AA6E4}">
+                <adec:decorative xmlns:adec="http://schemas.microsoft.com/office/drawing/2017/decorative" val="1"/>
+              </a:ext>
+            </a:extLst>
+          </p:cNvPr>
+          <p:cNvGraphicFramePr/>
+          <p:nvPr>
+            <p:extLst>
+              <p:ext uri="{D42A27DB-BD31-4B8C-83A1-F6EECF244321}">
+                <p14:modId xmlns:p14="http://schemas.microsoft.com/office/powerpoint/2010/main" val="3212724064"/>
+              </p:ext>
+            </p:extLst>
+          </p:nvPr>
+        </p:nvGraphicFramePr>
+        <p:xfrm>
+          <a:off x="908438" y="2062097"/>
+          <a:ext cx="6994333" cy="4146471"/>
+        </p:xfrm>
+        <a:graphic>
+          <a:graphicData uri="http://schemas.openxmlformats.org/drawingml/2006/diagram">
+            <dgm:relIds xmlns:dgm="http://schemas.openxmlformats.org/drawingml/2006/diagram" xmlns:r="http://schemas.openxmlformats.org/officeDocument/2006/relationships" r:dm="rId5" r:lo="rId6" r:qs="rId7" r:cs="rId8"/>
+          </a:graphicData>
+        </a:graphic>
+      </p:graphicFrame>
+      <p:sp>
+        <p:nvSpPr>
+          <p:cNvPr id="12" name="Rectángulo 11">
+            <a:extLst>
+              <a:ext uri="{FF2B5EF4-FFF2-40B4-BE49-F238E27FC236}">
+                <a16:creationId xmlns:a16="http://schemas.microsoft.com/office/drawing/2014/main" id="{1FC0DB1A-ECEE-472D-8487-099B9F0FE2C0}"/>
+              </a:ext>
+            </a:extLst>
+          </p:cNvPr>
+          <p:cNvSpPr/>
+          <p:nvPr/>
+        </p:nvSpPr>
+        <p:spPr>
+          <a:xfrm>
+            <a:off x="5235879" y="6208568"/>
+            <a:ext cx="3551486" cy="461665"/>
+          </a:xfrm>
+          <a:prstGeom prst="rect">
+            <a:avLst/>
+          </a:prstGeom>
+          <a:noFill/>
+        </p:spPr>
+        <p:txBody>
+          <a:bodyPr wrap="square" lIns="91440" tIns="45720" rIns="91440" bIns="45720">
+            <a:spAutoFit/>
+          </a:bodyPr>
+          <a:lstStyle/>
+          <a:p>
+            <a:pPr algn="ctr"/>
+            <a:r>
+              <a:rPr lang="es-ES" sz="2400" dirty="0" err="1">
+                <a:ln w="0"/>
+                <a:effectLst>
+                  <a:outerShdw blurRad="38100" dist="19050" dir="2700000" algn="tl" rotWithShape="0">
+                    <a:schemeClr val="dk1">
+                      <a:alpha val="40000"/>
+                    </a:schemeClr>
+                  </a:outerShdw>
+                </a:effectLst>
+              </a:rPr>
+              <a:t>c</a:t>
+            </a:r>
+            <a:r>
+              <a:rPr lang="es-ES" sz="2400" b="0" cap="none" spc="0" dirty="0" err="1">
+                <a:ln w="0"/>
+                <a:solidFill>
+                  <a:schemeClr val="tx1"/>
+                </a:solidFill>
+                <a:effectLst>
+                  <a:outerShdw blurRad="38100" dist="19050" dir="2700000" algn="tl" rotWithShape="0">
+                    <a:schemeClr val="dk1">
+                      <a:alpha val="40000"/>
+                    </a:schemeClr>
+                  </a:outerShdw>
+                </a:effectLst>
+              </a:rPr>
+              <a:t>eteris</a:t>
+            </a:r>
+            <a:r>
+              <a:rPr lang="es-ES" sz="2400" b="0" cap="none" spc="0" dirty="0">
+                <a:ln w="0"/>
+                <a:solidFill>
+                  <a:schemeClr val="tx1"/>
+                </a:solidFill>
+                <a:effectLst>
+                  <a:outerShdw blurRad="38100" dist="19050" dir="2700000" algn="tl" rotWithShape="0">
+                    <a:schemeClr val="dk1">
+                      <a:alpha val="40000"/>
+                    </a:schemeClr>
+                  </a:outerShdw>
+                </a:effectLst>
+              </a:rPr>
+              <a:t> </a:t>
+            </a:r>
+            <a:r>
+              <a:rPr lang="es-ES" sz="2400" b="0" cap="none" spc="0" dirty="0" err="1">
+                <a:ln w="0"/>
+                <a:solidFill>
+                  <a:schemeClr val="tx1"/>
+                </a:solidFill>
+                <a:effectLst>
+                  <a:outerShdw blurRad="38100" dist="19050" dir="2700000" algn="tl" rotWithShape="0">
+                    <a:schemeClr val="dk1">
+                      <a:alpha val="40000"/>
+                    </a:schemeClr>
+                  </a:outerShdw>
+                </a:effectLst>
+              </a:rPr>
+              <a:t>paribus</a:t>
+            </a:r>
+            <a:endParaRPr lang="es-ES" sz="2400" b="0" cap="none" spc="0" dirty="0">
+              <a:ln w="0"/>
+              <a:solidFill>
+                <a:schemeClr val="tx1"/>
+              </a:solidFill>
+              <a:effectLst>
+                <a:outerShdw blurRad="38100" dist="19050" dir="2700000" algn="tl" rotWithShape="0">
+                  <a:schemeClr val="dk1">
+                    <a:alpha val="40000"/>
+                  </a:schemeClr>
+                </a:outerShdw>
+              </a:effectLst>
+            </a:endParaRPr>
+          </a:p>
+        </p:txBody>
+      </p:sp>
+    </p:spTree>
+    <p:extLst>
+      <p:ext uri="{BB962C8B-B14F-4D97-AF65-F5344CB8AC3E}">
+        <p14:creationId xmlns:p14="http://schemas.microsoft.com/office/powerpoint/2010/main" val="3677300149"/>
+      </p:ext>
+    </p:extLst>
+  </p:cSld>
+  <p:clrMapOvr>
+    <a:masterClrMapping/>
+  </p:clrMapOvr>
+</p:sld>
+</file>
+
+<file path=ppt/slides/slide17.xml><?xml version="1.0" encoding="utf-8"?>
+<p:sld xmlns:a="http://schemas.openxmlformats.org/drawingml/2006/main" xmlns:r="http://schemas.openxmlformats.org/officeDocument/2006/relationships" xmlns:p="http://schemas.openxmlformats.org/presentationml/2006/main">
+  <p:cSld>
+    <p:spTree>
+      <p:nvGrpSpPr>
+        <p:cNvPr id="1" name=""/>
+        <p:cNvGrpSpPr/>
+        <p:nvPr/>
+      </p:nvGrpSpPr>
+      <p:grpSpPr>
+        <a:xfrm>
+          <a:off x="0" y="0"/>
+          <a:ext cx="0" cy="0"/>
+          <a:chOff x="0" y="0"/>
+          <a:chExt cx="0" cy="0"/>
+        </a:xfrm>
+      </p:grpSpPr>
       <p:sp>
         <p:nvSpPr>
           <p:cNvPr id="2" name="Título 1">
@@ -10981,6 +14270,12 @@
             <a:r>
               <a:rPr lang="es-GT" dirty="0"/>
               <a:t> para ver su diferencia.</a:t>
+            </a:r>
+          </a:p>
+          <a:p>
+            <a:r>
+              <a:rPr lang="es-GT" dirty="0"/>
+              <a:t>Submuestreo no fue efectivo.</a:t>
             </a:r>
           </a:p>
           <a:p>
@@ -11570,7 +14865,7 @@
 </p:sld>
 </file>
 
-<file path=ppt/slides/slide16.xml><?xml version="1.0" encoding="utf-8"?>
+<file path=ppt/slides/slide18.xml><?xml version="1.0" encoding="utf-8"?>
 <p:sld xmlns:a="http://schemas.openxmlformats.org/drawingml/2006/main" xmlns:r="http://schemas.openxmlformats.org/officeDocument/2006/relationships" xmlns:p="http://schemas.openxmlformats.org/presentationml/2006/main">
   <p:cSld>
     <p:spTree>
@@ -12723,7 +16018,7 @@
 </p:sld>
 </file>
 
-<file path=ppt/slides/slide17.xml><?xml version="1.0" encoding="utf-8"?>
+<file path=ppt/slides/slide19.xml><?xml version="1.0" encoding="utf-8"?>
 <p:sld xmlns:a="http://schemas.openxmlformats.org/drawingml/2006/main" xmlns:r="http://schemas.openxmlformats.org/officeDocument/2006/relationships" xmlns:p="http://schemas.openxmlformats.org/presentationml/2006/main">
   <p:cSld>
     <p:spTree>
@@ -13220,314 +16515,6 @@
 </p:sld>
 </file>
 
-<file path=ppt/slides/slide18.xml><?xml version="1.0" encoding="utf-8"?>
-<p:sld xmlns:a="http://schemas.openxmlformats.org/drawingml/2006/main" xmlns:r="http://schemas.openxmlformats.org/officeDocument/2006/relationships" xmlns:p="http://schemas.openxmlformats.org/presentationml/2006/main">
-  <p:cSld>
-    <p:bg>
-      <p:bgPr>
-        <a:solidFill>
-          <a:schemeClr val="accent5">
-            <a:lumMod val="50000"/>
-          </a:schemeClr>
-        </a:solidFill>
-        <a:effectLst/>
-      </p:bgPr>
-    </p:bg>
-    <p:spTree>
-      <p:nvGrpSpPr>
-        <p:cNvPr id="1" name=""/>
-        <p:cNvGrpSpPr/>
-        <p:nvPr/>
-      </p:nvGrpSpPr>
-      <p:grpSpPr>
-        <a:xfrm>
-          <a:off x="0" y="0"/>
-          <a:ext cx="0" cy="0"/>
-          <a:chOff x="0" y="0"/>
-          <a:chExt cx="0" cy="0"/>
-        </a:xfrm>
-      </p:grpSpPr>
-      <p:pic>
-        <p:nvPicPr>
-          <p:cNvPr id="15" name="Gráfico 14" descr="Notación musical">
-            <a:extLst>
-              <a:ext uri="{FF2B5EF4-FFF2-40B4-BE49-F238E27FC236}">
-                <a16:creationId xmlns:a16="http://schemas.microsoft.com/office/drawing/2014/main" id="{2A123BD8-A09C-49C0-98E8-54B55610A928}"/>
-              </a:ext>
-            </a:extLst>
-          </p:cNvPr>
-          <p:cNvPicPr>
-            <a:picLocks noChangeAspect="1"/>
-          </p:cNvPicPr>
-          <p:nvPr/>
-        </p:nvPicPr>
-        <p:blipFill>
-          <a:blip r:embed="rId3">
-            <a:extLst>
-              <a:ext uri="{28A0092B-C50C-407E-A947-70E740481C1C}">
-                <a14:useLocalDpi xmlns:a14="http://schemas.microsoft.com/office/drawing/2010/main" val="0"/>
-              </a:ext>
-              <a:ext uri="{96DAC541-7B7A-43D3-8B79-37D633B846F1}">
-                <asvg:svgBlip xmlns:asvg="http://schemas.microsoft.com/office/drawing/2016/SVG/main" r:embed="rId4"/>
-              </a:ext>
-            </a:extLst>
-          </a:blip>
-          <a:srcRect/>
-          <a:stretch/>
-        </p:blipFill>
-        <p:spPr>
-          <a:xfrm rot="631394">
-            <a:off x="3790715" y="4482751"/>
-            <a:ext cx="3194131" cy="3194131"/>
-          </a:xfrm>
-          <a:prstGeom prst="rect">
-            <a:avLst/>
-          </a:prstGeom>
-        </p:spPr>
-      </p:pic>
-      <p:pic>
-        <p:nvPicPr>
-          <p:cNvPr id="11" name="Gráfico 10" descr="Teclas de piano">
-            <a:extLst>
-              <a:ext uri="{FF2B5EF4-FFF2-40B4-BE49-F238E27FC236}">
-                <a16:creationId xmlns:a16="http://schemas.microsoft.com/office/drawing/2014/main" id="{3CB00449-E308-4DF3-9CFD-9A7D30B672DE}"/>
-              </a:ext>
-            </a:extLst>
-          </p:cNvPr>
-          <p:cNvPicPr>
-            <a:picLocks noChangeAspect="1"/>
-          </p:cNvPicPr>
-          <p:nvPr/>
-        </p:nvPicPr>
-        <p:blipFill>
-          <a:blip r:embed="rId5">
-            <a:extLst>
-              <a:ext uri="{28A0092B-C50C-407E-A947-70E740481C1C}">
-                <a14:useLocalDpi xmlns:a14="http://schemas.microsoft.com/office/drawing/2010/main" val="0"/>
-              </a:ext>
-              <a:ext uri="{96DAC541-7B7A-43D3-8B79-37D633B846F1}">
-                <asvg:svgBlip xmlns:asvg="http://schemas.microsoft.com/office/drawing/2016/SVG/main" r:embed="rId6"/>
-              </a:ext>
-            </a:extLst>
-          </a:blip>
-          <a:srcRect/>
-          <a:stretch/>
-        </p:blipFill>
-        <p:spPr>
-          <a:xfrm rot="1338607" flipH="1">
-            <a:off x="-587261" y="1663257"/>
-            <a:ext cx="2684499" cy="2684499"/>
-          </a:xfrm>
-          <a:prstGeom prst="rect">
-            <a:avLst/>
-          </a:prstGeom>
-        </p:spPr>
-      </p:pic>
-      <p:pic>
-        <p:nvPicPr>
-          <p:cNvPr id="7" name="Gráfico 6" descr="Clave de fa">
-            <a:extLst>
-              <a:ext uri="{FF2B5EF4-FFF2-40B4-BE49-F238E27FC236}">
-                <a16:creationId xmlns:a16="http://schemas.microsoft.com/office/drawing/2014/main" id="{88D22565-F42F-439B-A6A4-CF161165E6B6}"/>
-              </a:ext>
-            </a:extLst>
-          </p:cNvPr>
-          <p:cNvPicPr>
-            <a:picLocks noChangeAspect="1"/>
-          </p:cNvPicPr>
-          <p:nvPr/>
-        </p:nvPicPr>
-        <p:blipFill>
-          <a:blip r:embed="rId7">
-            <a:extLst>
-              <a:ext uri="{28A0092B-C50C-407E-A947-70E740481C1C}">
-                <a14:useLocalDpi xmlns:a14="http://schemas.microsoft.com/office/drawing/2010/main" val="0"/>
-              </a:ext>
-              <a:ext uri="{96DAC541-7B7A-43D3-8B79-37D633B846F1}">
-                <asvg:svgBlip xmlns:asvg="http://schemas.microsoft.com/office/drawing/2016/SVG/main" r:embed="rId8"/>
-              </a:ext>
-            </a:extLst>
-          </a:blip>
-          <a:srcRect/>
-          <a:stretch/>
-        </p:blipFill>
-        <p:spPr>
-          <a:xfrm rot="1213697">
-            <a:off x="-491837" y="3688628"/>
-            <a:ext cx="3245427" cy="3245427"/>
-          </a:xfrm>
-          <a:prstGeom prst="rect">
-            <a:avLst/>
-          </a:prstGeom>
-        </p:spPr>
-      </p:pic>
-      <p:pic>
-        <p:nvPicPr>
-          <p:cNvPr id="9" name="Gráfico 8" descr="Clave de sol">
-            <a:extLst>
-              <a:ext uri="{FF2B5EF4-FFF2-40B4-BE49-F238E27FC236}">
-                <a16:creationId xmlns:a16="http://schemas.microsoft.com/office/drawing/2014/main" id="{B46E3E84-D1E6-4422-AA93-3EE98A821B98}"/>
-              </a:ext>
-            </a:extLst>
-          </p:cNvPr>
-          <p:cNvPicPr>
-            <a:picLocks noChangeAspect="1"/>
-          </p:cNvPicPr>
-          <p:nvPr/>
-        </p:nvPicPr>
-        <p:blipFill>
-          <a:blip r:embed="rId9">
-            <a:extLst>
-              <a:ext uri="{28A0092B-C50C-407E-A947-70E740481C1C}">
-                <a14:useLocalDpi xmlns:a14="http://schemas.microsoft.com/office/drawing/2010/main" val="0"/>
-              </a:ext>
-              <a:ext uri="{96DAC541-7B7A-43D3-8B79-37D633B846F1}">
-                <asvg:svgBlip xmlns:asvg="http://schemas.microsoft.com/office/drawing/2016/SVG/main" r:embed="rId10"/>
-              </a:ext>
-            </a:extLst>
-          </a:blip>
-          <a:srcRect/>
-          <a:stretch/>
-        </p:blipFill>
-        <p:spPr>
-          <a:xfrm rot="20451125">
-            <a:off x="8614445" y="-118161"/>
-            <a:ext cx="3005286" cy="3005286"/>
-          </a:xfrm>
-          <a:prstGeom prst="rect">
-            <a:avLst/>
-          </a:prstGeom>
-        </p:spPr>
-      </p:pic>
-      <p:pic>
-        <p:nvPicPr>
-          <p:cNvPr id="13" name="Gráfico 12" descr="Guitarra eléctrica">
-            <a:extLst>
-              <a:ext uri="{FF2B5EF4-FFF2-40B4-BE49-F238E27FC236}">
-                <a16:creationId xmlns:a16="http://schemas.microsoft.com/office/drawing/2014/main" id="{6A56DF0C-1331-406E-AEE6-06E0E59FB9A8}"/>
-              </a:ext>
-            </a:extLst>
-          </p:cNvPr>
-          <p:cNvPicPr>
-            <a:picLocks noChangeAspect="1"/>
-          </p:cNvPicPr>
-          <p:nvPr/>
-        </p:nvPicPr>
-        <p:blipFill>
-          <a:blip r:embed="rId11">
-            <a:extLst>
-              <a:ext uri="{28A0092B-C50C-407E-A947-70E740481C1C}">
-                <a14:useLocalDpi xmlns:a14="http://schemas.microsoft.com/office/drawing/2010/main" val="0"/>
-              </a:ext>
-              <a:ext uri="{96DAC541-7B7A-43D3-8B79-37D633B846F1}">
-                <asvg:svgBlip xmlns:asvg="http://schemas.microsoft.com/office/drawing/2016/SVG/main" r:embed="rId12"/>
-              </a:ext>
-            </a:extLst>
-          </a:blip>
-          <a:srcRect/>
-          <a:stretch/>
-        </p:blipFill>
-        <p:spPr>
-          <a:xfrm rot="21078969">
-            <a:off x="1920309" y="4797205"/>
-            <a:ext cx="2453456" cy="2453456"/>
-          </a:xfrm>
-          <a:prstGeom prst="rect">
-            <a:avLst/>
-          </a:prstGeom>
-        </p:spPr>
-      </p:pic>
-      <p:pic>
-        <p:nvPicPr>
-          <p:cNvPr id="19" name="Gráfico 18" descr="Regla">
-            <a:extLst>
-              <a:ext uri="{FF2B5EF4-FFF2-40B4-BE49-F238E27FC236}">
-                <a16:creationId xmlns:a16="http://schemas.microsoft.com/office/drawing/2014/main" id="{39130E3C-1E93-4315-AE76-13C55147DCF2}"/>
-              </a:ext>
-            </a:extLst>
-          </p:cNvPr>
-          <p:cNvPicPr>
-            <a:picLocks noChangeAspect="1"/>
-          </p:cNvPicPr>
-          <p:nvPr/>
-        </p:nvPicPr>
-        <p:blipFill>
-          <a:blip r:embed="rId13">
-            <a:extLst>
-              <a:ext uri="{28A0092B-C50C-407E-A947-70E740481C1C}">
-                <a14:useLocalDpi xmlns:a14="http://schemas.microsoft.com/office/drawing/2010/main" val="0"/>
-              </a:ext>
-              <a:ext uri="{96DAC541-7B7A-43D3-8B79-37D633B846F1}">
-                <asvg:svgBlip xmlns:asvg="http://schemas.microsoft.com/office/drawing/2016/SVG/main" r:embed="rId14"/>
-              </a:ext>
-            </a:extLst>
-          </a:blip>
-          <a:stretch>
-            <a:fillRect/>
-          </a:stretch>
-        </p:blipFill>
-        <p:spPr>
-          <a:xfrm rot="18889495">
-            <a:off x="10171718" y="145767"/>
-            <a:ext cx="1574403" cy="1574403"/>
-          </a:xfrm>
-          <a:prstGeom prst="rect">
-            <a:avLst/>
-          </a:prstGeom>
-        </p:spPr>
-      </p:pic>
-      <p:pic>
-        <p:nvPicPr>
-          <p:cNvPr id="21" name="Gráfico 20" descr="Lápiz">
-            <a:extLst>
-              <a:ext uri="{FF2B5EF4-FFF2-40B4-BE49-F238E27FC236}">
-                <a16:creationId xmlns:a16="http://schemas.microsoft.com/office/drawing/2014/main" id="{FFEC1660-205F-490E-800A-0D57D250BAE4}"/>
-              </a:ext>
-            </a:extLst>
-          </p:cNvPr>
-          <p:cNvPicPr>
-            <a:picLocks noChangeAspect="1"/>
-          </p:cNvPicPr>
-          <p:nvPr/>
-        </p:nvPicPr>
-        <p:blipFill>
-          <a:blip r:embed="rId15">
-            <a:extLst>
-              <a:ext uri="{28A0092B-C50C-407E-A947-70E740481C1C}">
-                <a14:useLocalDpi xmlns:a14="http://schemas.microsoft.com/office/drawing/2010/main" val="0"/>
-              </a:ext>
-              <a:ext uri="{96DAC541-7B7A-43D3-8B79-37D633B846F1}">
-                <asvg:svgBlip xmlns:asvg="http://schemas.microsoft.com/office/drawing/2016/SVG/main" r:embed="rId16"/>
-              </a:ext>
-            </a:extLst>
-          </a:blip>
-          <a:stretch>
-            <a:fillRect/>
-          </a:stretch>
-        </p:blipFill>
-        <p:spPr>
-          <a:xfrm rot="20520790">
-            <a:off x="10917677" y="783939"/>
-            <a:ext cx="1488402" cy="1488402"/>
-          </a:xfrm>
-          <a:prstGeom prst="rect">
-            <a:avLst/>
-          </a:prstGeom>
-        </p:spPr>
-      </p:pic>
-    </p:spTree>
-    <p:extLst>
-      <p:ext uri="{BB962C8B-B14F-4D97-AF65-F5344CB8AC3E}">
-        <p14:creationId xmlns:p14="http://schemas.microsoft.com/office/powerpoint/2010/main" val="990298224"/>
-      </p:ext>
-    </p:extLst>
-  </p:cSld>
-  <p:clrMapOvr>
-    <a:masterClrMapping/>
-  </p:clrMapOvr>
-</p:sld>
-</file>
-
 <file path=ppt/slides/slide2.xml><?xml version="1.0" encoding="utf-8"?>
 <p:sld xmlns:a="http://schemas.openxmlformats.org/drawingml/2006/main" xmlns:r="http://schemas.openxmlformats.org/officeDocument/2006/relationships" xmlns:p="http://schemas.openxmlformats.org/presentationml/2006/main">
   <p:cSld>
@@ -14029,6 +17016,314 @@
     <p:extLst>
       <p:ext uri="{BB962C8B-B14F-4D97-AF65-F5344CB8AC3E}">
         <p14:creationId xmlns:p14="http://schemas.microsoft.com/office/powerpoint/2010/main" val="2671002067"/>
+      </p:ext>
+    </p:extLst>
+  </p:cSld>
+  <p:clrMapOvr>
+    <a:masterClrMapping/>
+  </p:clrMapOvr>
+</p:sld>
+</file>
+
+<file path=ppt/slides/slide20.xml><?xml version="1.0" encoding="utf-8"?>
+<p:sld xmlns:a="http://schemas.openxmlformats.org/drawingml/2006/main" xmlns:r="http://schemas.openxmlformats.org/officeDocument/2006/relationships" xmlns:p="http://schemas.openxmlformats.org/presentationml/2006/main">
+  <p:cSld>
+    <p:bg>
+      <p:bgPr>
+        <a:solidFill>
+          <a:schemeClr val="accent5">
+            <a:lumMod val="50000"/>
+          </a:schemeClr>
+        </a:solidFill>
+        <a:effectLst/>
+      </p:bgPr>
+    </p:bg>
+    <p:spTree>
+      <p:nvGrpSpPr>
+        <p:cNvPr id="1" name=""/>
+        <p:cNvGrpSpPr/>
+        <p:nvPr/>
+      </p:nvGrpSpPr>
+      <p:grpSpPr>
+        <a:xfrm>
+          <a:off x="0" y="0"/>
+          <a:ext cx="0" cy="0"/>
+          <a:chOff x="0" y="0"/>
+          <a:chExt cx="0" cy="0"/>
+        </a:xfrm>
+      </p:grpSpPr>
+      <p:pic>
+        <p:nvPicPr>
+          <p:cNvPr id="15" name="Gráfico 14" descr="Notación musical">
+            <a:extLst>
+              <a:ext uri="{FF2B5EF4-FFF2-40B4-BE49-F238E27FC236}">
+                <a16:creationId xmlns:a16="http://schemas.microsoft.com/office/drawing/2014/main" id="{2A123BD8-A09C-49C0-98E8-54B55610A928}"/>
+              </a:ext>
+            </a:extLst>
+          </p:cNvPr>
+          <p:cNvPicPr>
+            <a:picLocks noChangeAspect="1"/>
+          </p:cNvPicPr>
+          <p:nvPr/>
+        </p:nvPicPr>
+        <p:blipFill>
+          <a:blip r:embed="rId3">
+            <a:extLst>
+              <a:ext uri="{28A0092B-C50C-407E-A947-70E740481C1C}">
+                <a14:useLocalDpi xmlns:a14="http://schemas.microsoft.com/office/drawing/2010/main" val="0"/>
+              </a:ext>
+              <a:ext uri="{96DAC541-7B7A-43D3-8B79-37D633B846F1}">
+                <asvg:svgBlip xmlns:asvg="http://schemas.microsoft.com/office/drawing/2016/SVG/main" r:embed="rId4"/>
+              </a:ext>
+            </a:extLst>
+          </a:blip>
+          <a:srcRect/>
+          <a:stretch/>
+        </p:blipFill>
+        <p:spPr>
+          <a:xfrm rot="631394">
+            <a:off x="3790715" y="4482751"/>
+            <a:ext cx="3194131" cy="3194131"/>
+          </a:xfrm>
+          <a:prstGeom prst="rect">
+            <a:avLst/>
+          </a:prstGeom>
+        </p:spPr>
+      </p:pic>
+      <p:pic>
+        <p:nvPicPr>
+          <p:cNvPr id="11" name="Gráfico 10" descr="Teclas de piano">
+            <a:extLst>
+              <a:ext uri="{FF2B5EF4-FFF2-40B4-BE49-F238E27FC236}">
+                <a16:creationId xmlns:a16="http://schemas.microsoft.com/office/drawing/2014/main" id="{3CB00449-E308-4DF3-9CFD-9A7D30B672DE}"/>
+              </a:ext>
+            </a:extLst>
+          </p:cNvPr>
+          <p:cNvPicPr>
+            <a:picLocks noChangeAspect="1"/>
+          </p:cNvPicPr>
+          <p:nvPr/>
+        </p:nvPicPr>
+        <p:blipFill>
+          <a:blip r:embed="rId5">
+            <a:extLst>
+              <a:ext uri="{28A0092B-C50C-407E-A947-70E740481C1C}">
+                <a14:useLocalDpi xmlns:a14="http://schemas.microsoft.com/office/drawing/2010/main" val="0"/>
+              </a:ext>
+              <a:ext uri="{96DAC541-7B7A-43D3-8B79-37D633B846F1}">
+                <asvg:svgBlip xmlns:asvg="http://schemas.microsoft.com/office/drawing/2016/SVG/main" r:embed="rId6"/>
+              </a:ext>
+            </a:extLst>
+          </a:blip>
+          <a:srcRect/>
+          <a:stretch/>
+        </p:blipFill>
+        <p:spPr>
+          <a:xfrm rot="1338607" flipH="1">
+            <a:off x="-587261" y="1663257"/>
+            <a:ext cx="2684499" cy="2684499"/>
+          </a:xfrm>
+          <a:prstGeom prst="rect">
+            <a:avLst/>
+          </a:prstGeom>
+        </p:spPr>
+      </p:pic>
+      <p:pic>
+        <p:nvPicPr>
+          <p:cNvPr id="7" name="Gráfico 6" descr="Clave de fa">
+            <a:extLst>
+              <a:ext uri="{FF2B5EF4-FFF2-40B4-BE49-F238E27FC236}">
+                <a16:creationId xmlns:a16="http://schemas.microsoft.com/office/drawing/2014/main" id="{88D22565-F42F-439B-A6A4-CF161165E6B6}"/>
+              </a:ext>
+            </a:extLst>
+          </p:cNvPr>
+          <p:cNvPicPr>
+            <a:picLocks noChangeAspect="1"/>
+          </p:cNvPicPr>
+          <p:nvPr/>
+        </p:nvPicPr>
+        <p:blipFill>
+          <a:blip r:embed="rId7">
+            <a:extLst>
+              <a:ext uri="{28A0092B-C50C-407E-A947-70E740481C1C}">
+                <a14:useLocalDpi xmlns:a14="http://schemas.microsoft.com/office/drawing/2010/main" val="0"/>
+              </a:ext>
+              <a:ext uri="{96DAC541-7B7A-43D3-8B79-37D633B846F1}">
+                <asvg:svgBlip xmlns:asvg="http://schemas.microsoft.com/office/drawing/2016/SVG/main" r:embed="rId8"/>
+              </a:ext>
+            </a:extLst>
+          </a:blip>
+          <a:srcRect/>
+          <a:stretch/>
+        </p:blipFill>
+        <p:spPr>
+          <a:xfrm rot="1213697">
+            <a:off x="-491837" y="3688628"/>
+            <a:ext cx="3245427" cy="3245427"/>
+          </a:xfrm>
+          <a:prstGeom prst="rect">
+            <a:avLst/>
+          </a:prstGeom>
+        </p:spPr>
+      </p:pic>
+      <p:pic>
+        <p:nvPicPr>
+          <p:cNvPr id="9" name="Gráfico 8" descr="Clave de sol">
+            <a:extLst>
+              <a:ext uri="{FF2B5EF4-FFF2-40B4-BE49-F238E27FC236}">
+                <a16:creationId xmlns:a16="http://schemas.microsoft.com/office/drawing/2014/main" id="{B46E3E84-D1E6-4422-AA93-3EE98A821B98}"/>
+              </a:ext>
+            </a:extLst>
+          </p:cNvPr>
+          <p:cNvPicPr>
+            <a:picLocks noChangeAspect="1"/>
+          </p:cNvPicPr>
+          <p:nvPr/>
+        </p:nvPicPr>
+        <p:blipFill>
+          <a:blip r:embed="rId9">
+            <a:extLst>
+              <a:ext uri="{28A0092B-C50C-407E-A947-70E740481C1C}">
+                <a14:useLocalDpi xmlns:a14="http://schemas.microsoft.com/office/drawing/2010/main" val="0"/>
+              </a:ext>
+              <a:ext uri="{96DAC541-7B7A-43D3-8B79-37D633B846F1}">
+                <asvg:svgBlip xmlns:asvg="http://schemas.microsoft.com/office/drawing/2016/SVG/main" r:embed="rId10"/>
+              </a:ext>
+            </a:extLst>
+          </a:blip>
+          <a:srcRect/>
+          <a:stretch/>
+        </p:blipFill>
+        <p:spPr>
+          <a:xfrm rot="20451125">
+            <a:off x="8614445" y="-118161"/>
+            <a:ext cx="3005286" cy="3005286"/>
+          </a:xfrm>
+          <a:prstGeom prst="rect">
+            <a:avLst/>
+          </a:prstGeom>
+        </p:spPr>
+      </p:pic>
+      <p:pic>
+        <p:nvPicPr>
+          <p:cNvPr id="13" name="Gráfico 12" descr="Guitarra eléctrica">
+            <a:extLst>
+              <a:ext uri="{FF2B5EF4-FFF2-40B4-BE49-F238E27FC236}">
+                <a16:creationId xmlns:a16="http://schemas.microsoft.com/office/drawing/2014/main" id="{6A56DF0C-1331-406E-AEE6-06E0E59FB9A8}"/>
+              </a:ext>
+            </a:extLst>
+          </p:cNvPr>
+          <p:cNvPicPr>
+            <a:picLocks noChangeAspect="1"/>
+          </p:cNvPicPr>
+          <p:nvPr/>
+        </p:nvPicPr>
+        <p:blipFill>
+          <a:blip r:embed="rId11">
+            <a:extLst>
+              <a:ext uri="{28A0092B-C50C-407E-A947-70E740481C1C}">
+                <a14:useLocalDpi xmlns:a14="http://schemas.microsoft.com/office/drawing/2010/main" val="0"/>
+              </a:ext>
+              <a:ext uri="{96DAC541-7B7A-43D3-8B79-37D633B846F1}">
+                <asvg:svgBlip xmlns:asvg="http://schemas.microsoft.com/office/drawing/2016/SVG/main" r:embed="rId12"/>
+              </a:ext>
+            </a:extLst>
+          </a:blip>
+          <a:srcRect/>
+          <a:stretch/>
+        </p:blipFill>
+        <p:spPr>
+          <a:xfrm rot="21078969">
+            <a:off x="1920309" y="4797205"/>
+            <a:ext cx="2453456" cy="2453456"/>
+          </a:xfrm>
+          <a:prstGeom prst="rect">
+            <a:avLst/>
+          </a:prstGeom>
+        </p:spPr>
+      </p:pic>
+      <p:pic>
+        <p:nvPicPr>
+          <p:cNvPr id="19" name="Gráfico 18" descr="Regla">
+            <a:extLst>
+              <a:ext uri="{FF2B5EF4-FFF2-40B4-BE49-F238E27FC236}">
+                <a16:creationId xmlns:a16="http://schemas.microsoft.com/office/drawing/2014/main" id="{39130E3C-1E93-4315-AE76-13C55147DCF2}"/>
+              </a:ext>
+            </a:extLst>
+          </p:cNvPr>
+          <p:cNvPicPr>
+            <a:picLocks noChangeAspect="1"/>
+          </p:cNvPicPr>
+          <p:nvPr/>
+        </p:nvPicPr>
+        <p:blipFill>
+          <a:blip r:embed="rId13">
+            <a:extLst>
+              <a:ext uri="{28A0092B-C50C-407E-A947-70E740481C1C}">
+                <a14:useLocalDpi xmlns:a14="http://schemas.microsoft.com/office/drawing/2010/main" val="0"/>
+              </a:ext>
+              <a:ext uri="{96DAC541-7B7A-43D3-8B79-37D633B846F1}">
+                <asvg:svgBlip xmlns:asvg="http://schemas.microsoft.com/office/drawing/2016/SVG/main" r:embed="rId14"/>
+              </a:ext>
+            </a:extLst>
+          </a:blip>
+          <a:stretch>
+            <a:fillRect/>
+          </a:stretch>
+        </p:blipFill>
+        <p:spPr>
+          <a:xfrm rot="18889495">
+            <a:off x="10171718" y="145767"/>
+            <a:ext cx="1574403" cy="1574403"/>
+          </a:xfrm>
+          <a:prstGeom prst="rect">
+            <a:avLst/>
+          </a:prstGeom>
+        </p:spPr>
+      </p:pic>
+      <p:pic>
+        <p:nvPicPr>
+          <p:cNvPr id="21" name="Gráfico 20" descr="Lápiz">
+            <a:extLst>
+              <a:ext uri="{FF2B5EF4-FFF2-40B4-BE49-F238E27FC236}">
+                <a16:creationId xmlns:a16="http://schemas.microsoft.com/office/drawing/2014/main" id="{FFEC1660-205F-490E-800A-0D57D250BAE4}"/>
+              </a:ext>
+            </a:extLst>
+          </p:cNvPr>
+          <p:cNvPicPr>
+            <a:picLocks noChangeAspect="1"/>
+          </p:cNvPicPr>
+          <p:nvPr/>
+        </p:nvPicPr>
+        <p:blipFill>
+          <a:blip r:embed="rId15">
+            <a:extLst>
+              <a:ext uri="{28A0092B-C50C-407E-A947-70E740481C1C}">
+                <a14:useLocalDpi xmlns:a14="http://schemas.microsoft.com/office/drawing/2010/main" val="0"/>
+              </a:ext>
+              <a:ext uri="{96DAC541-7B7A-43D3-8B79-37D633B846F1}">
+                <asvg:svgBlip xmlns:asvg="http://schemas.microsoft.com/office/drawing/2016/SVG/main" r:embed="rId16"/>
+              </a:ext>
+            </a:extLst>
+          </a:blip>
+          <a:stretch>
+            <a:fillRect/>
+          </a:stretch>
+        </p:blipFill>
+        <p:spPr>
+          <a:xfrm rot="20520790">
+            <a:off x="10917677" y="783939"/>
+            <a:ext cx="1488402" cy="1488402"/>
+          </a:xfrm>
+          <a:prstGeom prst="rect">
+            <a:avLst/>
+          </a:prstGeom>
+        </p:spPr>
+      </p:pic>
+    </p:spTree>
+    <p:extLst>
+      <p:ext uri="{BB962C8B-B14F-4D97-AF65-F5344CB8AC3E}">
+        <p14:creationId xmlns:p14="http://schemas.microsoft.com/office/powerpoint/2010/main" val="990298224"/>
       </p:ext>
     </p:extLst>
   </p:cSld>
@@ -15251,7 +18546,7 @@
                 <a:ea typeface="Tahoma" panose="020B0604030504040204" pitchFamily="34" charset="0"/>
                 <a:cs typeface="Tahoma" panose="020B0604030504040204" pitchFamily="34" charset="0"/>
               </a:rPr>
-              <a:t> originalmente tiene 79 categorías podría ser demasiado pesado para el entrenamiento, por lo que se tomaron las primeras 11 clases que tenían elementos más abundantes.</a:t>
+              <a:t> originalmente tiene 79 categorías podría ser demasiado pesado para el entrenamiento, por lo que se tomaron las primeras 11 clases que tenían elementos más abundantes. Permanecieron 24,479 datos.</a:t>
             </a:r>
           </a:p>
           <a:p>

</xml_diff>